<commit_message>
Some Updates as well as some changes
</commit_message>
<xml_diff>
--- a/MST-Visualizer (2nd ppt)- Copy.pptx
+++ b/MST-Visualizer (2nd ppt)- Copy.pptx
@@ -5,42 +5,44 @@
     <p:sldMasterId id="2147483648" r:id="rId1"/>
   </p:sldMasterIdLst>
   <p:notesMasterIdLst>
-    <p:notesMasterId r:id="rId9"/>
+    <p:notesMasterId r:id="rId11"/>
   </p:notesMasterIdLst>
   <p:sldIdLst>
     <p:sldId id="256" r:id="rId2"/>
     <p:sldId id="257" r:id="rId3"/>
-    <p:sldId id="260" r:id="rId4"/>
-    <p:sldId id="261" r:id="rId5"/>
-    <p:sldId id="258" r:id="rId6"/>
-    <p:sldId id="259" r:id="rId7"/>
-    <p:sldId id="262" r:id="rId8"/>
+    <p:sldId id="263" r:id="rId4"/>
+    <p:sldId id="264" r:id="rId5"/>
+    <p:sldId id="260" r:id="rId6"/>
+    <p:sldId id="261" r:id="rId7"/>
+    <p:sldId id="258" r:id="rId8"/>
+    <p:sldId id="259" r:id="rId9"/>
+    <p:sldId id="262" r:id="rId10"/>
   </p:sldIdLst>
   <p:sldSz cx="18288000" cy="10287000"/>
   <p:notesSz cx="6858000" cy="9144000"/>
   <p:embeddedFontLst>
     <p:embeddedFont>
-      <p:font typeface="PT Serif Bold" panose="020B0604020202020204" charset="0"/>
-      <p:regular r:id="rId10"/>
+      <p:font typeface="DM Sans" panose="020B0604020202020204" charset="0"/>
+      <p:regular r:id="rId12"/>
     </p:embeddedFont>
     <p:embeddedFont>
       <p:font typeface="PT Serif" panose="020B0604020202020204" charset="0"/>
-      <p:regular r:id="rId11"/>
+      <p:regular r:id="rId13"/>
+    </p:embeddedFont>
+    <p:embeddedFont>
+      <p:font typeface="DM Sans Bold" panose="020B0604020202020204" charset="0"/>
+      <p:regular r:id="rId14"/>
+    </p:embeddedFont>
+    <p:embeddedFont>
+      <p:font typeface="PT Serif Bold" panose="020B0604020202020204" charset="0"/>
+      <p:regular r:id="rId15"/>
     </p:embeddedFont>
     <p:embeddedFont>
       <p:font typeface="Calibri" panose="020F0502020204030204" pitchFamily="34" charset="0"/>
-      <p:regular r:id="rId12"/>
-      <p:bold r:id="rId13"/>
-      <p:italic r:id="rId14"/>
-      <p:boldItalic r:id="rId15"/>
-    </p:embeddedFont>
-    <p:embeddedFont>
-      <p:font typeface="DM Sans Bold" panose="020B0604020202020204" charset="0"/>
       <p:regular r:id="rId16"/>
-    </p:embeddedFont>
-    <p:embeddedFont>
-      <p:font typeface="DM Sans" panose="020B0604020202020204" charset="0"/>
-      <p:regular r:id="rId17"/>
+      <p:bold r:id="rId17"/>
+      <p:italic r:id="rId18"/>
+      <p:boldItalic r:id="rId19"/>
     </p:embeddedFont>
   </p:embeddedFontLst>
   <p:defaultTextStyle>
@@ -5217,7 +5219,7 @@
             <a:blip r:embed="rId6">
               <a:extLst>
                 <a:ext uri="{96DAC541-7B7A-43D3-8B79-37D633B846F1}">
-                  <asvg:svgBlip xmlns="" xmlns:asvg="http://schemas.microsoft.com/office/drawing/2016/SVG/main" r:embed="rId7"/>
+                  <asvg:svgBlip xmlns:asvg="http://schemas.microsoft.com/office/drawing/2016/SVG/main" xmlns="" r:embed="rId7"/>
                 </a:ext>
               </a:extLst>
             </a:blip>
@@ -5269,7 +5271,7 @@
             <a:blip r:embed="rId8">
               <a:extLst>
                 <a:ext uri="{96DAC541-7B7A-43D3-8B79-37D633B846F1}">
-                  <asvg:svgBlip xmlns="" xmlns:asvg="http://schemas.microsoft.com/office/drawing/2016/SVG/main" r:embed="rId9"/>
+                  <asvg:svgBlip xmlns:asvg="http://schemas.microsoft.com/office/drawing/2016/SVG/main" xmlns="" r:embed="rId9"/>
                 </a:ext>
               </a:extLst>
             </a:blip>
@@ -5806,7 +5808,7 @@
             <a:blip r:embed="rId3">
               <a:extLst>
                 <a:ext uri="{96DAC541-7B7A-43D3-8B79-37D633B846F1}">
-                  <asvg:svgBlip xmlns="" xmlns:asvg="http://schemas.microsoft.com/office/drawing/2016/SVG/main" r:embed="rId4"/>
+                  <asvg:svgBlip xmlns:asvg="http://schemas.microsoft.com/office/drawing/2016/SVG/main" xmlns="" r:embed="rId4"/>
                 </a:ext>
               </a:extLst>
             </a:blip>
@@ -6045,7 +6047,7 @@
             <a:blip r:embed="rId6">
               <a:extLst>
                 <a:ext uri="{96DAC541-7B7A-43D3-8B79-37D633B846F1}">
-                  <asvg:svgBlip xmlns="" xmlns:asvg="http://schemas.microsoft.com/office/drawing/2016/SVG/main" r:embed="rId7"/>
+                  <asvg:svgBlip xmlns:asvg="http://schemas.microsoft.com/office/drawing/2016/SVG/main" xmlns="" r:embed="rId7"/>
                 </a:ext>
               </a:extLst>
             </a:blip>
@@ -6528,9 +6530,641 @@
           </p:spPr>
         </p:sp>
       </p:grpSp>
-      <p:sp>
-        <p:nvSpPr>
-          <p:cNvPr id="4" name="Freeform 4"/>
+      <p:grpSp>
+        <p:nvGrpSpPr>
+          <p:cNvPr id="4" name="Group 4"/>
+          <p:cNvGrpSpPr/>
+          <p:nvPr/>
+        </p:nvGrpSpPr>
+        <p:grpSpPr>
+          <a:xfrm>
+            <a:off x="-152400" y="0"/>
+            <a:ext cx="18288000" cy="10287000"/>
+            <a:chOff x="0" y="0"/>
+            <a:chExt cx="24384000" cy="13716000"/>
+          </a:xfrm>
+        </p:grpSpPr>
+        <p:sp>
+          <p:nvSpPr>
+            <p:cNvPr id="5" name="Freeform 5"/>
+            <p:cNvSpPr/>
+            <p:nvPr/>
+          </p:nvSpPr>
+          <p:spPr>
+            <a:xfrm>
+              <a:off x="0" y="0"/>
+              <a:ext cx="24384000" cy="13716000"/>
+            </a:xfrm>
+            <a:custGeom>
+              <a:avLst/>
+              <a:gdLst/>
+              <a:ahLst/>
+              <a:cxnLst/>
+              <a:rect l="l" t="t" r="r" b="b"/>
+              <a:pathLst>
+                <a:path w="24384000" h="13716000">
+                  <a:moveTo>
+                    <a:pt x="0" y="0"/>
+                  </a:moveTo>
+                  <a:lnTo>
+                    <a:pt x="24384000" y="0"/>
+                  </a:lnTo>
+                  <a:lnTo>
+                    <a:pt x="24384000" y="13716000"/>
+                  </a:lnTo>
+                  <a:lnTo>
+                    <a:pt x="0" y="13716000"/>
+                  </a:lnTo>
+                  <a:close/>
+                </a:path>
+              </a:pathLst>
+            </a:custGeom>
+            <a:solidFill>
+              <a:srgbClr val="FFFFFF"/>
+            </a:solidFill>
+          </p:spPr>
+        </p:sp>
+      </p:grpSp>
+      <p:sp>
+        <p:nvSpPr>
+          <p:cNvPr id="6" name="Freeform 6"/>
+          <p:cNvSpPr/>
+          <p:nvPr/>
+        </p:nvSpPr>
+        <p:spPr>
+          <a:xfrm rot="3471976" flipH="1" flipV="1">
+            <a:off x="11646919" y="-2755363"/>
+            <a:ext cx="5780943" cy="7633090"/>
+          </a:xfrm>
+          <a:custGeom>
+            <a:avLst/>
+            <a:gdLst/>
+            <a:ahLst/>
+            <a:cxnLst/>
+            <a:rect l="l" t="t" r="r" b="b"/>
+            <a:pathLst>
+              <a:path w="5780943" h="7633090">
+                <a:moveTo>
+                  <a:pt x="5780944" y="7633090"/>
+                </a:moveTo>
+                <a:lnTo>
+                  <a:pt x="0" y="7633090"/>
+                </a:lnTo>
+                <a:lnTo>
+                  <a:pt x="0" y="0"/>
+                </a:lnTo>
+                <a:lnTo>
+                  <a:pt x="5780944" y="0"/>
+                </a:lnTo>
+                <a:lnTo>
+                  <a:pt x="5780944" y="7633090"/>
+                </a:lnTo>
+                <a:close/>
+              </a:path>
+            </a:pathLst>
+          </a:custGeom>
+          <a:blipFill>
+            <a:blip r:embed="rId2">
+              <a:extLst>
+                <a:ext uri="{96DAC541-7B7A-43D3-8B79-37D633B846F1}">
+                  <asvg:svgBlip xmlns="" xmlns:asvg="http://schemas.microsoft.com/office/drawing/2016/SVG/main" r:embed="rId4"/>
+                </a:ext>
+              </a:extLst>
+            </a:blip>
+            <a:stretch>
+              <a:fillRect/>
+            </a:stretch>
+          </a:blipFill>
+        </p:spPr>
+      </p:sp>
+      <p:sp>
+        <p:nvSpPr>
+          <p:cNvPr id="7" name="Freeform 7"/>
+          <p:cNvSpPr/>
+          <p:nvPr/>
+        </p:nvSpPr>
+        <p:spPr>
+          <a:xfrm rot="1695503">
+            <a:off x="-667352" y="-1248037"/>
+            <a:ext cx="5780943" cy="7633090"/>
+          </a:xfrm>
+          <a:custGeom>
+            <a:avLst/>
+            <a:gdLst/>
+            <a:ahLst/>
+            <a:cxnLst/>
+            <a:rect l="l" t="t" r="r" b="b"/>
+            <a:pathLst>
+              <a:path w="5780943" h="7633090">
+                <a:moveTo>
+                  <a:pt x="0" y="0"/>
+                </a:moveTo>
+                <a:lnTo>
+                  <a:pt x="5780944" y="0"/>
+                </a:lnTo>
+                <a:lnTo>
+                  <a:pt x="5780944" y="7633091"/>
+                </a:lnTo>
+                <a:lnTo>
+                  <a:pt x="0" y="7633091"/>
+                </a:lnTo>
+                <a:lnTo>
+                  <a:pt x="0" y="0"/>
+                </a:lnTo>
+                <a:close/>
+              </a:path>
+            </a:pathLst>
+          </a:custGeom>
+          <a:blipFill>
+            <a:blip r:embed="rId2">
+              <a:extLst>
+                <a:ext uri="{96DAC541-7B7A-43D3-8B79-37D633B846F1}">
+                  <asvg:svgBlip xmlns="" xmlns:asvg="http://schemas.microsoft.com/office/drawing/2016/SVG/main" r:embed="rId4"/>
+                </a:ext>
+              </a:extLst>
+            </a:blip>
+            <a:stretch>
+              <a:fillRect/>
+            </a:stretch>
+          </a:blipFill>
+        </p:spPr>
+      </p:sp>
+      <p:grpSp>
+        <p:nvGrpSpPr>
+          <p:cNvPr id="8" name="Group 8"/>
+          <p:cNvGrpSpPr/>
+          <p:nvPr/>
+        </p:nvGrpSpPr>
+        <p:grpSpPr>
+          <a:xfrm>
+            <a:off x="852487" y="3025527"/>
+            <a:ext cx="16425862" cy="1808857"/>
+            <a:chOff x="0" y="0"/>
+            <a:chExt cx="21901150" cy="2411810"/>
+          </a:xfrm>
+        </p:grpSpPr>
+        <p:sp>
+          <p:nvSpPr>
+            <p:cNvPr id="9" name="Freeform 9"/>
+            <p:cNvSpPr/>
+            <p:nvPr/>
+          </p:nvSpPr>
+          <p:spPr>
+            <a:xfrm>
+              <a:off x="0" y="0"/>
+              <a:ext cx="21901150" cy="2411857"/>
+            </a:xfrm>
+            <a:custGeom>
+              <a:avLst/>
+              <a:gdLst/>
+              <a:ahLst/>
+              <a:cxnLst/>
+              <a:rect l="l" t="t" r="r" b="b"/>
+              <a:pathLst>
+                <a:path w="21901150" h="2411857">
+                  <a:moveTo>
+                    <a:pt x="0" y="53213"/>
+                  </a:moveTo>
+                  <a:cubicBezTo>
+                    <a:pt x="0" y="23876"/>
+                    <a:pt x="23876" y="0"/>
+                    <a:pt x="53213" y="0"/>
+                  </a:cubicBezTo>
+                  <a:lnTo>
+                    <a:pt x="21847938" y="0"/>
+                  </a:lnTo>
+                  <a:cubicBezTo>
+                    <a:pt x="21877275" y="0"/>
+                    <a:pt x="21901150" y="23876"/>
+                    <a:pt x="21901150" y="53213"/>
+                  </a:cubicBezTo>
+                  <a:lnTo>
+                    <a:pt x="21901150" y="2358644"/>
+                  </a:lnTo>
+                  <a:cubicBezTo>
+                    <a:pt x="21901150" y="2387981"/>
+                    <a:pt x="21877275" y="2411857"/>
+                    <a:pt x="21847938" y="2411857"/>
+                  </a:cubicBezTo>
+                  <a:lnTo>
+                    <a:pt x="53213" y="2411857"/>
+                  </a:lnTo>
+                  <a:cubicBezTo>
+                    <a:pt x="23876" y="2411857"/>
+                    <a:pt x="0" y="2387981"/>
+                    <a:pt x="0" y="2358644"/>
+                  </a:cubicBezTo>
+                  <a:close/>
+                </a:path>
+              </a:pathLst>
+            </a:custGeom>
+            <a:solidFill>
+              <a:srgbClr val="D8EBFA"/>
+            </a:solidFill>
+          </p:spPr>
+        </p:sp>
+      </p:grpSp>
+      <p:grpSp>
+        <p:nvGrpSpPr>
+          <p:cNvPr id="10" name="Group 10"/>
+          <p:cNvGrpSpPr/>
+          <p:nvPr/>
+        </p:nvGrpSpPr>
+        <p:grpSpPr>
+          <a:xfrm>
+            <a:off x="852488" y="3025527"/>
+            <a:ext cx="5208537" cy="4951607"/>
+            <a:chOff x="0" y="0"/>
+            <a:chExt cx="6944717" cy="6602142"/>
+          </a:xfrm>
+        </p:grpSpPr>
+        <p:sp>
+          <p:nvSpPr>
+            <p:cNvPr id="11" name="Freeform 11"/>
+            <p:cNvSpPr/>
+            <p:nvPr/>
+          </p:nvSpPr>
+          <p:spPr>
+            <a:xfrm>
+              <a:off x="0" y="0"/>
+              <a:ext cx="6944741" cy="6602189"/>
+            </a:xfrm>
+            <a:custGeom>
+              <a:avLst/>
+              <a:gdLst/>
+              <a:ahLst/>
+              <a:cxnLst/>
+              <a:rect l="l" t="t" r="r" b="b"/>
+              <a:pathLst>
+                <a:path w="6944741" h="6602189">
+                  <a:moveTo>
+                    <a:pt x="0" y="145666"/>
+                  </a:moveTo>
+                  <a:cubicBezTo>
+                    <a:pt x="0" y="65359"/>
+                    <a:pt x="22713" y="0"/>
+                    <a:pt x="50621" y="0"/>
+                  </a:cubicBezTo>
+                  <a:lnTo>
+                    <a:pt x="6894119" y="0"/>
+                  </a:lnTo>
+                  <a:cubicBezTo>
+                    <a:pt x="6922027" y="0"/>
+                    <a:pt x="6944741" y="65359"/>
+                    <a:pt x="6944741" y="145666"/>
+                  </a:cubicBezTo>
+                  <a:lnTo>
+                    <a:pt x="6944741" y="6456605"/>
+                  </a:lnTo>
+                  <a:cubicBezTo>
+                    <a:pt x="6944741" y="6536913"/>
+                    <a:pt x="6922027" y="6602189"/>
+                    <a:pt x="6894119" y="6602189"/>
+                  </a:cubicBezTo>
+                  <a:lnTo>
+                    <a:pt x="50621" y="6602189"/>
+                  </a:lnTo>
+                  <a:cubicBezTo>
+                    <a:pt x="22713" y="6602189"/>
+                    <a:pt x="0" y="6536913"/>
+                    <a:pt x="0" y="6456605"/>
+                  </a:cubicBezTo>
+                  <a:close/>
+                </a:path>
+              </a:pathLst>
+            </a:custGeom>
+            <a:solidFill>
+              <a:srgbClr val="D8EBFA"/>
+            </a:solidFill>
+          </p:spPr>
+        </p:sp>
+      </p:grpSp>
+      <p:grpSp>
+        <p:nvGrpSpPr>
+          <p:cNvPr id="12" name="Group 12"/>
+          <p:cNvGrpSpPr/>
+          <p:nvPr/>
+        </p:nvGrpSpPr>
+        <p:grpSpPr>
+          <a:xfrm>
+            <a:off x="6416427" y="3025527"/>
+            <a:ext cx="5297984" cy="4951607"/>
+            <a:chOff x="0" y="0"/>
+            <a:chExt cx="7063978" cy="6602142"/>
+          </a:xfrm>
+        </p:grpSpPr>
+        <p:sp>
+          <p:nvSpPr>
+            <p:cNvPr id="13" name="Freeform 13"/>
+            <p:cNvSpPr/>
+            <p:nvPr/>
+          </p:nvSpPr>
+          <p:spPr>
+            <a:xfrm>
+              <a:off x="0" y="0"/>
+              <a:ext cx="7064003" cy="6602189"/>
+            </a:xfrm>
+            <a:custGeom>
+              <a:avLst/>
+              <a:gdLst/>
+              <a:ahLst/>
+              <a:cxnLst/>
+              <a:rect l="l" t="t" r="r" b="b"/>
+              <a:pathLst>
+                <a:path w="7064003" h="6602189">
+                  <a:moveTo>
+                    <a:pt x="0" y="0"/>
+                  </a:moveTo>
+                  <a:lnTo>
+                    <a:pt x="7064003" y="0"/>
+                  </a:lnTo>
+                  <a:lnTo>
+                    <a:pt x="7064003" y="6602189"/>
+                  </a:lnTo>
+                  <a:lnTo>
+                    <a:pt x="0" y="6602189"/>
+                  </a:lnTo>
+                  <a:close/>
+                </a:path>
+              </a:pathLst>
+            </a:custGeom>
+            <a:solidFill>
+              <a:srgbClr val="D8EBFA"/>
+            </a:solidFill>
+          </p:spPr>
+        </p:sp>
+      </p:grpSp>
+      <p:grpSp>
+        <p:nvGrpSpPr>
+          <p:cNvPr id="14" name="Group 14"/>
+          <p:cNvGrpSpPr/>
+          <p:nvPr/>
+        </p:nvGrpSpPr>
+        <p:grpSpPr>
+          <a:xfrm>
+            <a:off x="6327725" y="3025527"/>
+            <a:ext cx="28575" cy="1808857"/>
+            <a:chOff x="0" y="0"/>
+            <a:chExt cx="38100" cy="2411810"/>
+          </a:xfrm>
+        </p:grpSpPr>
+        <p:sp>
+          <p:nvSpPr>
+            <p:cNvPr id="15" name="Freeform 15"/>
+            <p:cNvSpPr/>
+            <p:nvPr/>
+          </p:nvSpPr>
+          <p:spPr>
+            <a:xfrm>
+              <a:off x="0" y="0"/>
+              <a:ext cx="38100" cy="2411857"/>
+            </a:xfrm>
+            <a:custGeom>
+              <a:avLst/>
+              <a:gdLst/>
+              <a:ahLst/>
+              <a:cxnLst/>
+              <a:rect l="l" t="t" r="r" b="b"/>
+              <a:pathLst>
+                <a:path w="38100" h="2411857">
+                  <a:moveTo>
+                    <a:pt x="0" y="19050"/>
+                  </a:moveTo>
+                  <a:cubicBezTo>
+                    <a:pt x="0" y="8509"/>
+                    <a:pt x="8509" y="0"/>
+                    <a:pt x="19050" y="0"/>
+                  </a:cubicBezTo>
+                  <a:cubicBezTo>
+                    <a:pt x="29591" y="0"/>
+                    <a:pt x="38100" y="8509"/>
+                    <a:pt x="38100" y="19050"/>
+                  </a:cubicBezTo>
+                  <a:lnTo>
+                    <a:pt x="38100" y="2392807"/>
+                  </a:lnTo>
+                  <a:cubicBezTo>
+                    <a:pt x="38100" y="2403348"/>
+                    <a:pt x="29591" y="2411857"/>
+                    <a:pt x="19050" y="2411857"/>
+                  </a:cubicBezTo>
+                  <a:cubicBezTo>
+                    <a:pt x="8509" y="2411857"/>
+                    <a:pt x="0" y="2403348"/>
+                    <a:pt x="0" y="2392807"/>
+                  </a:cubicBezTo>
+                  <a:close/>
+                </a:path>
+              </a:pathLst>
+            </a:custGeom>
+            <a:solidFill>
+              <a:srgbClr val="D8D4D4"/>
+            </a:solidFill>
+          </p:spPr>
+        </p:sp>
+      </p:grpSp>
+      <p:grpSp>
+        <p:nvGrpSpPr>
+          <p:cNvPr id="16" name="Group 16"/>
+          <p:cNvGrpSpPr/>
+          <p:nvPr/>
+        </p:nvGrpSpPr>
+        <p:grpSpPr>
+          <a:xfrm>
+            <a:off x="12012514" y="3025527"/>
+            <a:ext cx="5168205" cy="4951607"/>
+            <a:chOff x="0" y="0"/>
+            <a:chExt cx="6890940" cy="6602142"/>
+          </a:xfrm>
+        </p:grpSpPr>
+        <p:sp>
+          <p:nvSpPr>
+            <p:cNvPr id="17" name="Freeform 17"/>
+            <p:cNvSpPr/>
+            <p:nvPr/>
+          </p:nvSpPr>
+          <p:spPr>
+            <a:xfrm>
+              <a:off x="0" y="0"/>
+              <a:ext cx="6890896" cy="6602189"/>
+            </a:xfrm>
+            <a:custGeom>
+              <a:avLst/>
+              <a:gdLst/>
+              <a:ahLst/>
+              <a:cxnLst/>
+              <a:rect l="l" t="t" r="r" b="b"/>
+              <a:pathLst>
+                <a:path w="6890896" h="6602189">
+                  <a:moveTo>
+                    <a:pt x="0" y="0"/>
+                  </a:moveTo>
+                  <a:lnTo>
+                    <a:pt x="6890896" y="0"/>
+                  </a:lnTo>
+                  <a:lnTo>
+                    <a:pt x="6890896" y="6602189"/>
+                  </a:lnTo>
+                  <a:lnTo>
+                    <a:pt x="0" y="6602189"/>
+                  </a:lnTo>
+                  <a:close/>
+                </a:path>
+              </a:pathLst>
+            </a:custGeom>
+            <a:solidFill>
+              <a:srgbClr val="D8EBFA"/>
+            </a:solidFill>
+          </p:spPr>
+        </p:sp>
+      </p:grpSp>
+      <p:grpSp>
+        <p:nvGrpSpPr>
+          <p:cNvPr id="18" name="Group 18"/>
+          <p:cNvGrpSpPr/>
+          <p:nvPr/>
+        </p:nvGrpSpPr>
+        <p:grpSpPr>
+          <a:xfrm>
+            <a:off x="11802964" y="3025527"/>
+            <a:ext cx="28575" cy="1808857"/>
+            <a:chOff x="0" y="0"/>
+            <a:chExt cx="38100" cy="2411810"/>
+          </a:xfrm>
+        </p:grpSpPr>
+        <p:sp>
+          <p:nvSpPr>
+            <p:cNvPr id="19" name="Freeform 19"/>
+            <p:cNvSpPr/>
+            <p:nvPr/>
+          </p:nvSpPr>
+          <p:spPr>
+            <a:xfrm>
+              <a:off x="0" y="0"/>
+              <a:ext cx="38100" cy="2411857"/>
+            </a:xfrm>
+            <a:custGeom>
+              <a:avLst/>
+              <a:gdLst/>
+              <a:ahLst/>
+              <a:cxnLst/>
+              <a:rect l="l" t="t" r="r" b="b"/>
+              <a:pathLst>
+                <a:path w="38100" h="2411857">
+                  <a:moveTo>
+                    <a:pt x="0" y="19050"/>
+                  </a:moveTo>
+                  <a:cubicBezTo>
+                    <a:pt x="0" y="8509"/>
+                    <a:pt x="8509" y="0"/>
+                    <a:pt x="19050" y="0"/>
+                  </a:cubicBezTo>
+                  <a:cubicBezTo>
+                    <a:pt x="29591" y="0"/>
+                    <a:pt x="38100" y="8509"/>
+                    <a:pt x="38100" y="19050"/>
+                  </a:cubicBezTo>
+                  <a:lnTo>
+                    <a:pt x="38100" y="2392807"/>
+                  </a:lnTo>
+                  <a:cubicBezTo>
+                    <a:pt x="38100" y="2403348"/>
+                    <a:pt x="29591" y="2411857"/>
+                    <a:pt x="19050" y="2411857"/>
+                  </a:cubicBezTo>
+                  <a:cubicBezTo>
+                    <a:pt x="8509" y="2411857"/>
+                    <a:pt x="0" y="2403348"/>
+                    <a:pt x="0" y="2392807"/>
+                  </a:cubicBezTo>
+                  <a:close/>
+                </a:path>
+              </a:pathLst>
+            </a:custGeom>
+            <a:solidFill>
+              <a:srgbClr val="D8D4D4"/>
+            </a:solidFill>
+          </p:spPr>
+        </p:sp>
+      </p:grpSp>
+      <p:grpSp>
+        <p:nvGrpSpPr>
+          <p:cNvPr id="20" name="Group 20"/>
+          <p:cNvGrpSpPr/>
+          <p:nvPr/>
+        </p:nvGrpSpPr>
+        <p:grpSpPr>
+          <a:xfrm>
+            <a:off x="852487" y="8290024"/>
+            <a:ext cx="5297984" cy="968276"/>
+            <a:chOff x="0" y="0"/>
+            <a:chExt cx="7063978" cy="1291035"/>
+          </a:xfrm>
+        </p:grpSpPr>
+        <p:sp>
+          <p:nvSpPr>
+            <p:cNvPr id="21" name="Freeform 21"/>
+            <p:cNvSpPr/>
+            <p:nvPr/>
+          </p:nvSpPr>
+          <p:spPr>
+            <a:xfrm>
+              <a:off x="0" y="0"/>
+              <a:ext cx="7063994" cy="1291082"/>
+            </a:xfrm>
+            <a:custGeom>
+              <a:avLst/>
+              <a:gdLst/>
+              <a:ahLst/>
+              <a:cxnLst/>
+              <a:rect l="l" t="t" r="r" b="b"/>
+              <a:pathLst>
+                <a:path w="7063994" h="1291082">
+                  <a:moveTo>
+                    <a:pt x="0" y="53213"/>
+                  </a:moveTo>
+                  <a:cubicBezTo>
+                    <a:pt x="0" y="23876"/>
+                    <a:pt x="23876" y="0"/>
+                    <a:pt x="53213" y="0"/>
+                  </a:cubicBezTo>
+                  <a:lnTo>
+                    <a:pt x="7010781" y="0"/>
+                  </a:lnTo>
+                  <a:cubicBezTo>
+                    <a:pt x="7040118" y="0"/>
+                    <a:pt x="7063994" y="23876"/>
+                    <a:pt x="7063994" y="53213"/>
+                  </a:cubicBezTo>
+                  <a:lnTo>
+                    <a:pt x="7063994" y="1237869"/>
+                  </a:lnTo>
+                  <a:cubicBezTo>
+                    <a:pt x="7063994" y="1267206"/>
+                    <a:pt x="7040118" y="1291082"/>
+                    <a:pt x="7010781" y="1291082"/>
+                  </a:cubicBezTo>
+                  <a:lnTo>
+                    <a:pt x="53213" y="1291082"/>
+                  </a:lnTo>
+                  <a:cubicBezTo>
+                    <a:pt x="23876" y="1291082"/>
+                    <a:pt x="0" y="1267206"/>
+                    <a:pt x="0" y="1237869"/>
+                  </a:cubicBezTo>
+                  <a:close/>
+                </a:path>
+              </a:pathLst>
+            </a:custGeom>
+            <a:solidFill>
+              <a:srgbClr val="0B74BA"/>
+            </a:solidFill>
+          </p:spPr>
+        </p:sp>
+      </p:grpSp>
+      <p:sp>
+        <p:nvSpPr>
+          <p:cNvPr id="22" name="Freeform 22"/>
           <p:cNvSpPr/>
           <p:nvPr/>
         </p:nvSpPr>
@@ -6567,7 +7201,963 @@
             </a:pathLst>
           </a:custGeom>
           <a:blipFill>
-            <a:blip r:embed="rId3">
+            <a:blip r:embed="rId5">
+              <a:extLst>
+                <a:ext uri="{96DAC541-7B7A-43D3-8B79-37D633B846F1}">
+                  <asvg:svgBlip xmlns="" xmlns:asvg="http://schemas.microsoft.com/office/drawing/2016/SVG/main" r:embed="rId6"/>
+                </a:ext>
+              </a:extLst>
+            </a:blip>
+            <a:stretch>
+              <a:fillRect/>
+            </a:stretch>
+          </a:blipFill>
+        </p:spPr>
+      </p:sp>
+      <p:grpSp>
+        <p:nvGrpSpPr>
+          <p:cNvPr id="23" name="Group 23"/>
+          <p:cNvGrpSpPr/>
+          <p:nvPr/>
+        </p:nvGrpSpPr>
+        <p:grpSpPr>
+          <a:xfrm>
+            <a:off x="6416427" y="8290024"/>
+            <a:ext cx="5297984" cy="968276"/>
+            <a:chOff x="0" y="0"/>
+            <a:chExt cx="7063978" cy="1291035"/>
+          </a:xfrm>
+        </p:grpSpPr>
+        <p:sp>
+          <p:nvSpPr>
+            <p:cNvPr id="24" name="Freeform 24"/>
+            <p:cNvSpPr/>
+            <p:nvPr/>
+          </p:nvSpPr>
+          <p:spPr>
+            <a:xfrm>
+              <a:off x="0" y="0"/>
+              <a:ext cx="7063994" cy="1291082"/>
+            </a:xfrm>
+            <a:custGeom>
+              <a:avLst/>
+              <a:gdLst/>
+              <a:ahLst/>
+              <a:cxnLst/>
+              <a:rect l="l" t="t" r="r" b="b"/>
+              <a:pathLst>
+                <a:path w="7063994" h="1291082">
+                  <a:moveTo>
+                    <a:pt x="0" y="53213"/>
+                  </a:moveTo>
+                  <a:cubicBezTo>
+                    <a:pt x="0" y="23876"/>
+                    <a:pt x="23876" y="0"/>
+                    <a:pt x="53213" y="0"/>
+                  </a:cubicBezTo>
+                  <a:lnTo>
+                    <a:pt x="7010781" y="0"/>
+                  </a:lnTo>
+                  <a:cubicBezTo>
+                    <a:pt x="7040118" y="0"/>
+                    <a:pt x="7063994" y="23876"/>
+                    <a:pt x="7063994" y="53213"/>
+                  </a:cubicBezTo>
+                  <a:lnTo>
+                    <a:pt x="7063994" y="1237869"/>
+                  </a:lnTo>
+                  <a:cubicBezTo>
+                    <a:pt x="7063994" y="1267206"/>
+                    <a:pt x="7040118" y="1291082"/>
+                    <a:pt x="7010781" y="1291082"/>
+                  </a:cubicBezTo>
+                  <a:lnTo>
+                    <a:pt x="53213" y="1291082"/>
+                  </a:lnTo>
+                  <a:cubicBezTo>
+                    <a:pt x="23876" y="1291082"/>
+                    <a:pt x="0" y="1267206"/>
+                    <a:pt x="0" y="1237869"/>
+                  </a:cubicBezTo>
+                  <a:close/>
+                </a:path>
+              </a:pathLst>
+            </a:custGeom>
+            <a:solidFill>
+              <a:srgbClr val="0B74BA"/>
+            </a:solidFill>
+          </p:spPr>
+        </p:sp>
+      </p:grpSp>
+      <p:grpSp>
+        <p:nvGrpSpPr>
+          <p:cNvPr id="25" name="Group 25"/>
+          <p:cNvGrpSpPr/>
+          <p:nvPr/>
+        </p:nvGrpSpPr>
+        <p:grpSpPr>
+          <a:xfrm>
+            <a:off x="11980366" y="8290024"/>
+            <a:ext cx="5297984" cy="968276"/>
+            <a:chOff x="0" y="0"/>
+            <a:chExt cx="7063978" cy="1291035"/>
+          </a:xfrm>
+        </p:grpSpPr>
+        <p:sp>
+          <p:nvSpPr>
+            <p:cNvPr id="26" name="Freeform 26"/>
+            <p:cNvSpPr/>
+            <p:nvPr/>
+          </p:nvSpPr>
+          <p:spPr>
+            <a:xfrm>
+              <a:off x="0" y="0"/>
+              <a:ext cx="7063994" cy="1291082"/>
+            </a:xfrm>
+            <a:custGeom>
+              <a:avLst/>
+              <a:gdLst/>
+              <a:ahLst/>
+              <a:cxnLst/>
+              <a:rect l="l" t="t" r="r" b="b"/>
+              <a:pathLst>
+                <a:path w="7063994" h="1291082">
+                  <a:moveTo>
+                    <a:pt x="0" y="53213"/>
+                  </a:moveTo>
+                  <a:cubicBezTo>
+                    <a:pt x="0" y="23876"/>
+                    <a:pt x="23876" y="0"/>
+                    <a:pt x="53213" y="0"/>
+                  </a:cubicBezTo>
+                  <a:lnTo>
+                    <a:pt x="7010781" y="0"/>
+                  </a:lnTo>
+                  <a:cubicBezTo>
+                    <a:pt x="7040118" y="0"/>
+                    <a:pt x="7063994" y="23876"/>
+                    <a:pt x="7063994" y="53213"/>
+                  </a:cubicBezTo>
+                  <a:lnTo>
+                    <a:pt x="7063994" y="1237869"/>
+                  </a:lnTo>
+                  <a:cubicBezTo>
+                    <a:pt x="7063994" y="1267206"/>
+                    <a:pt x="7040118" y="1291082"/>
+                    <a:pt x="7010781" y="1291082"/>
+                  </a:cubicBezTo>
+                  <a:lnTo>
+                    <a:pt x="53213" y="1291082"/>
+                  </a:lnTo>
+                  <a:cubicBezTo>
+                    <a:pt x="23876" y="1291082"/>
+                    <a:pt x="0" y="1267206"/>
+                    <a:pt x="0" y="1237869"/>
+                  </a:cubicBezTo>
+                  <a:close/>
+                </a:path>
+              </a:pathLst>
+            </a:custGeom>
+            <a:solidFill>
+              <a:srgbClr val="0B74BA"/>
+            </a:solidFill>
+          </p:spPr>
+        </p:sp>
+      </p:grpSp>
+      <p:sp>
+        <p:nvSpPr>
+          <p:cNvPr id="27" name="TextBox 27"/>
+          <p:cNvSpPr txBox="1"/>
+          <p:nvPr/>
+        </p:nvSpPr>
+        <p:spPr>
+          <a:xfrm>
+            <a:off x="852488" y="904875"/>
+            <a:ext cx="8635459" cy="849313"/>
+          </a:xfrm>
+          <a:prstGeom prst="rect">
+            <a:avLst/>
+          </a:prstGeom>
+        </p:spPr>
+        <p:txBody>
+          <a:bodyPr lIns="0" tIns="0" rIns="0" bIns="0" rtlCol="0" anchor="t">
+            <a:spAutoFit/>
+          </a:bodyPr>
+          <a:lstStyle/>
+          <a:p>
+            <a:pPr algn="l">
+              <a:lnSpc>
+                <a:spcPts val="6812"/>
+              </a:lnSpc>
+            </a:pPr>
+            <a:r>
+              <a:rPr lang="en-US" sz="5437" b="1">
+                <a:solidFill>
+                  <a:srgbClr val="020202"/>
+                </a:solidFill>
+                <a:latin typeface="PT Serif Bold"/>
+                <a:ea typeface="PT Serif Bold"/>
+                <a:cs typeface="PT Serif Bold"/>
+                <a:sym typeface="PT Serif Bold"/>
+              </a:rPr>
+              <a:t>Modular Project Structure</a:t>
+            </a:r>
+          </a:p>
+        </p:txBody>
+      </p:sp>
+      <p:sp>
+        <p:nvSpPr>
+          <p:cNvPr id="28" name="TextBox 28"/>
+          <p:cNvSpPr txBox="1"/>
+          <p:nvPr/>
+        </p:nvSpPr>
+        <p:spPr>
+          <a:xfrm>
+            <a:off x="873919" y="1901577"/>
+            <a:ext cx="14807059" cy="838200"/>
+          </a:xfrm>
+          <a:prstGeom prst="rect">
+            <a:avLst/>
+          </a:prstGeom>
+        </p:spPr>
+        <p:txBody>
+          <a:bodyPr lIns="0" tIns="0" rIns="0" bIns="0" rtlCol="0" anchor="t">
+            <a:spAutoFit/>
+          </a:bodyPr>
+          <a:lstStyle/>
+          <a:p>
+            <a:pPr algn="l">
+              <a:lnSpc>
+                <a:spcPts val="3314"/>
+              </a:lnSpc>
+            </a:pPr>
+            <a:r>
+              <a:rPr lang="en-US" sz="2762">
+                <a:solidFill>
+                  <a:srgbClr val="383838"/>
+                </a:solidFill>
+                <a:latin typeface="DM Sans"/>
+                <a:ea typeface="DM Sans"/>
+                <a:cs typeface="DM Sans"/>
+                <a:sym typeface="DM Sans"/>
+              </a:rPr>
+              <a:t>Clean separation of concerns across three architectural layers ensures maintainability, scalability, and efficient code organization.</a:t>
+            </a:r>
+          </a:p>
+        </p:txBody>
+      </p:sp>
+      <p:sp>
+        <p:nvSpPr>
+          <p:cNvPr id="29" name="TextBox 29"/>
+          <p:cNvSpPr txBox="1"/>
+          <p:nvPr/>
+        </p:nvSpPr>
+        <p:spPr>
+          <a:xfrm>
+            <a:off x="1118444" y="3272432"/>
+            <a:ext cx="3491805" cy="528438"/>
+          </a:xfrm>
+          <a:prstGeom prst="rect">
+            <a:avLst/>
+          </a:prstGeom>
+        </p:spPr>
+        <p:txBody>
+          <a:bodyPr lIns="0" tIns="0" rIns="0" bIns="0" rtlCol="0" anchor="t">
+            <a:spAutoFit/>
+          </a:bodyPr>
+          <a:lstStyle/>
+          <a:p>
+            <a:pPr algn="l">
+              <a:lnSpc>
+                <a:spcPts val="4254"/>
+              </a:lnSpc>
+            </a:pPr>
+            <a:r>
+              <a:rPr lang="en-US" sz="3387">
+                <a:solidFill>
+                  <a:srgbClr val="383838"/>
+                </a:solidFill>
+                <a:latin typeface="PT Serif"/>
+                <a:ea typeface="PT Serif"/>
+                <a:cs typeface="PT Serif"/>
+                <a:sym typeface="PT Serif"/>
+              </a:rPr>
+              <a:t>UI Layer</a:t>
+            </a:r>
+          </a:p>
+        </p:txBody>
+      </p:sp>
+      <p:sp>
+        <p:nvSpPr>
+          <p:cNvPr id="30" name="TextBox 30"/>
+          <p:cNvSpPr txBox="1"/>
+          <p:nvPr/>
+        </p:nvSpPr>
+        <p:spPr>
+          <a:xfrm>
+            <a:off x="1089124" y="4123135"/>
+            <a:ext cx="4943326" cy="2903293"/>
+          </a:xfrm>
+          <a:prstGeom prst="rect">
+            <a:avLst/>
+          </a:prstGeom>
+        </p:spPr>
+        <p:txBody>
+          <a:bodyPr lIns="0" tIns="0" rIns="0" bIns="0" rtlCol="0" anchor="t">
+            <a:spAutoFit/>
+          </a:bodyPr>
+          <a:lstStyle/>
+          <a:p>
+            <a:pPr marL="631501" lvl="1" indent="-315751" algn="l">
+              <a:lnSpc>
+                <a:spcPts val="4723"/>
+              </a:lnSpc>
+              <a:buFont typeface="Arial"/>
+              <a:buChar char="•"/>
+            </a:pPr>
+            <a:r>
+              <a:rPr lang="en-US" sz="2924">
+                <a:solidFill>
+                  <a:srgbClr val="383838"/>
+                </a:solidFill>
+                <a:latin typeface="DM Sans"/>
+                <a:ea typeface="DM Sans"/>
+                <a:cs typeface="DM Sans"/>
+                <a:sym typeface="DM Sans"/>
+              </a:rPr>
+              <a:t>index.html</a:t>
+            </a:r>
+          </a:p>
+          <a:p>
+            <a:pPr marL="631501" lvl="1" indent="-315751" algn="l">
+              <a:lnSpc>
+                <a:spcPts val="4723"/>
+              </a:lnSpc>
+              <a:buFont typeface="Arial"/>
+              <a:buChar char="•"/>
+            </a:pPr>
+            <a:r>
+              <a:rPr lang="en-US" sz="2924">
+                <a:solidFill>
+                  <a:srgbClr val="383838"/>
+                </a:solidFill>
+                <a:latin typeface="DM Sans"/>
+                <a:ea typeface="DM Sans"/>
+                <a:cs typeface="DM Sans"/>
+                <a:sym typeface="DM Sans"/>
+              </a:rPr>
+              <a:t>style.css </a:t>
+            </a:r>
+          </a:p>
+          <a:p>
+            <a:pPr marL="631501" lvl="1" indent="-315751" algn="l">
+              <a:lnSpc>
+                <a:spcPts val="4723"/>
+              </a:lnSpc>
+              <a:buFont typeface="Arial"/>
+              <a:buChar char="•"/>
+            </a:pPr>
+            <a:r>
+              <a:rPr lang="en-US" sz="2924">
+                <a:solidFill>
+                  <a:srgbClr val="383838"/>
+                </a:solidFill>
+                <a:latin typeface="DM Sans"/>
+                <a:ea typeface="DM Sans"/>
+                <a:cs typeface="DM Sans"/>
+                <a:sym typeface="DM Sans"/>
+              </a:rPr>
+              <a:t>dom.js </a:t>
+            </a:r>
+          </a:p>
+          <a:p>
+            <a:pPr marL="631501" lvl="1" indent="-315751" algn="l">
+              <a:lnSpc>
+                <a:spcPts val="4723"/>
+              </a:lnSpc>
+              <a:buFont typeface="Arial"/>
+              <a:buChar char="•"/>
+            </a:pPr>
+            <a:r>
+              <a:rPr lang="en-US" sz="2924">
+                <a:solidFill>
+                  <a:srgbClr val="383838"/>
+                </a:solidFill>
+                <a:latin typeface="DM Sans"/>
+                <a:ea typeface="DM Sans"/>
+                <a:cs typeface="DM Sans"/>
+                <a:sym typeface="DM Sans"/>
+              </a:rPr>
+              <a:t>graphDrawing.js </a:t>
+            </a:r>
+          </a:p>
+          <a:p>
+            <a:pPr marL="631501" lvl="1" indent="-315751" algn="l">
+              <a:lnSpc>
+                <a:spcPts val="4724"/>
+              </a:lnSpc>
+              <a:buFont typeface="Arial"/>
+              <a:buChar char="•"/>
+            </a:pPr>
+            <a:r>
+              <a:rPr lang="en-US" sz="2924">
+                <a:solidFill>
+                  <a:srgbClr val="383838"/>
+                </a:solidFill>
+                <a:latin typeface="DM Sans"/>
+                <a:ea typeface="DM Sans"/>
+                <a:cs typeface="DM Sans"/>
+                <a:sym typeface="DM Sans"/>
+              </a:rPr>
+              <a:t>modal.js</a:t>
+            </a:r>
+          </a:p>
+        </p:txBody>
+      </p:sp>
+      <p:sp>
+        <p:nvSpPr>
+          <p:cNvPr id="31" name="TextBox 31"/>
+          <p:cNvSpPr txBox="1"/>
+          <p:nvPr/>
+        </p:nvSpPr>
+        <p:spPr>
+          <a:xfrm>
+            <a:off x="6593681" y="3272432"/>
+            <a:ext cx="3491805" cy="528438"/>
+          </a:xfrm>
+          <a:prstGeom prst="rect">
+            <a:avLst/>
+          </a:prstGeom>
+        </p:spPr>
+        <p:txBody>
+          <a:bodyPr lIns="0" tIns="0" rIns="0" bIns="0" rtlCol="0" anchor="t">
+            <a:spAutoFit/>
+          </a:bodyPr>
+          <a:lstStyle/>
+          <a:p>
+            <a:pPr algn="l">
+              <a:lnSpc>
+                <a:spcPts val="4254"/>
+              </a:lnSpc>
+            </a:pPr>
+            <a:r>
+              <a:rPr lang="en-US" sz="3387">
+                <a:solidFill>
+                  <a:srgbClr val="383838"/>
+                </a:solidFill>
+                <a:latin typeface="PT Serif"/>
+                <a:ea typeface="PT Serif"/>
+                <a:cs typeface="PT Serif"/>
+                <a:sym typeface="PT Serif"/>
+              </a:rPr>
+              <a:t>Logic Layer</a:t>
+            </a:r>
+          </a:p>
+        </p:txBody>
+      </p:sp>
+      <p:sp>
+        <p:nvSpPr>
+          <p:cNvPr id="32" name="TextBox 32"/>
+          <p:cNvSpPr txBox="1"/>
+          <p:nvPr/>
+        </p:nvSpPr>
+        <p:spPr>
+          <a:xfrm>
+            <a:off x="6593681" y="4123135"/>
+            <a:ext cx="4943326" cy="2312743"/>
+          </a:xfrm>
+          <a:prstGeom prst="rect">
+            <a:avLst/>
+          </a:prstGeom>
+        </p:spPr>
+        <p:txBody>
+          <a:bodyPr lIns="0" tIns="0" rIns="0" bIns="0" rtlCol="0" anchor="t">
+            <a:spAutoFit/>
+          </a:bodyPr>
+          <a:lstStyle/>
+          <a:p>
+            <a:pPr marL="631501" lvl="1" indent="-315751" algn="l">
+              <a:lnSpc>
+                <a:spcPts val="4723"/>
+              </a:lnSpc>
+              <a:buFont typeface="Arial"/>
+              <a:buChar char="•"/>
+            </a:pPr>
+            <a:r>
+              <a:rPr lang="en-US" sz="2924">
+                <a:solidFill>
+                  <a:srgbClr val="383838"/>
+                </a:solidFill>
+                <a:latin typeface="DM Sans"/>
+                <a:ea typeface="DM Sans"/>
+                <a:cs typeface="DM Sans"/>
+                <a:sym typeface="DM Sans"/>
+              </a:rPr>
+              <a:t>state.js</a:t>
+            </a:r>
+          </a:p>
+          <a:p>
+            <a:pPr marL="631501" lvl="1" indent="-315751" algn="l">
+              <a:lnSpc>
+                <a:spcPts val="4723"/>
+              </a:lnSpc>
+              <a:buFont typeface="Arial"/>
+              <a:buChar char="•"/>
+            </a:pPr>
+            <a:r>
+              <a:rPr lang="en-US" sz="2924">
+                <a:solidFill>
+                  <a:srgbClr val="383838"/>
+                </a:solidFill>
+                <a:latin typeface="DM Sans"/>
+                <a:ea typeface="DM Sans"/>
+                <a:cs typeface="DM Sans"/>
+                <a:sym typeface="DM Sans"/>
+              </a:rPr>
+              <a:t>interactions.js</a:t>
+            </a:r>
+          </a:p>
+          <a:p>
+            <a:pPr marL="631501" lvl="1" indent="-315751" algn="l">
+              <a:lnSpc>
+                <a:spcPts val="4723"/>
+              </a:lnSpc>
+              <a:buFont typeface="Arial"/>
+              <a:buChar char="•"/>
+            </a:pPr>
+            <a:r>
+              <a:rPr lang="en-US" sz="2924">
+                <a:solidFill>
+                  <a:srgbClr val="383838"/>
+                </a:solidFill>
+                <a:latin typeface="DM Sans"/>
+                <a:ea typeface="DM Sans"/>
+                <a:cs typeface="DM Sans"/>
+                <a:sym typeface="DM Sans"/>
+              </a:rPr>
+              <a:t>graphGeneration.js</a:t>
+            </a:r>
+          </a:p>
+          <a:p>
+            <a:pPr marL="631501" lvl="1" indent="-315751" algn="l">
+              <a:lnSpc>
+                <a:spcPts val="4724"/>
+              </a:lnSpc>
+              <a:buFont typeface="Arial"/>
+              <a:buChar char="•"/>
+            </a:pPr>
+            <a:r>
+              <a:rPr lang="en-US" sz="2924">
+                <a:solidFill>
+                  <a:srgbClr val="383838"/>
+                </a:solidFill>
+                <a:latin typeface="DM Sans"/>
+                <a:ea typeface="DM Sans"/>
+                <a:cs typeface="DM Sans"/>
+                <a:sym typeface="DM Sans"/>
+              </a:rPr>
+              <a:t>utils.js</a:t>
+            </a:r>
+          </a:p>
+        </p:txBody>
+      </p:sp>
+      <p:sp>
+        <p:nvSpPr>
+          <p:cNvPr id="33" name="TextBox 33"/>
+          <p:cNvSpPr txBox="1"/>
+          <p:nvPr/>
+        </p:nvSpPr>
+        <p:spPr>
+          <a:xfrm>
+            <a:off x="12068919" y="3272432"/>
+            <a:ext cx="3491805" cy="528438"/>
+          </a:xfrm>
+          <a:prstGeom prst="rect">
+            <a:avLst/>
+          </a:prstGeom>
+        </p:spPr>
+        <p:txBody>
+          <a:bodyPr lIns="0" tIns="0" rIns="0" bIns="0" rtlCol="0" anchor="t">
+            <a:spAutoFit/>
+          </a:bodyPr>
+          <a:lstStyle/>
+          <a:p>
+            <a:pPr algn="l">
+              <a:lnSpc>
+                <a:spcPts val="4254"/>
+              </a:lnSpc>
+            </a:pPr>
+            <a:r>
+              <a:rPr lang="en-US" sz="3387">
+                <a:solidFill>
+                  <a:srgbClr val="383838"/>
+                </a:solidFill>
+                <a:latin typeface="PT Serif"/>
+                <a:ea typeface="PT Serif"/>
+                <a:cs typeface="PT Serif"/>
+                <a:sym typeface="PT Serif"/>
+              </a:rPr>
+              <a:t>Algorithm Layer</a:t>
+            </a:r>
+          </a:p>
+        </p:txBody>
+      </p:sp>
+      <p:sp>
+        <p:nvSpPr>
+          <p:cNvPr id="34" name="TextBox 34"/>
+          <p:cNvSpPr txBox="1"/>
+          <p:nvPr/>
+        </p:nvSpPr>
+        <p:spPr>
+          <a:xfrm>
+            <a:off x="12126814" y="4123135"/>
+            <a:ext cx="4943475" cy="1131643"/>
+          </a:xfrm>
+          <a:prstGeom prst="rect">
+            <a:avLst/>
+          </a:prstGeom>
+        </p:spPr>
+        <p:txBody>
+          <a:bodyPr lIns="0" tIns="0" rIns="0" bIns="0" rtlCol="0" anchor="t">
+            <a:spAutoFit/>
+          </a:bodyPr>
+          <a:lstStyle/>
+          <a:p>
+            <a:pPr marL="631501" lvl="1" indent="-315751" algn="l">
+              <a:lnSpc>
+                <a:spcPts val="4723"/>
+              </a:lnSpc>
+              <a:buFont typeface="Arial"/>
+              <a:buChar char="•"/>
+            </a:pPr>
+            <a:r>
+              <a:rPr lang="en-US" sz="2924">
+                <a:solidFill>
+                  <a:srgbClr val="383838"/>
+                </a:solidFill>
+                <a:latin typeface="DM Sans"/>
+                <a:ea typeface="DM Sans"/>
+                <a:cs typeface="DM Sans"/>
+                <a:sym typeface="DM Sans"/>
+              </a:rPr>
+              <a:t>algorithms.js</a:t>
+            </a:r>
+          </a:p>
+          <a:p>
+            <a:pPr marL="631501" lvl="1" indent="-315751" algn="l">
+              <a:lnSpc>
+                <a:spcPts val="4724"/>
+              </a:lnSpc>
+              <a:buFont typeface="Arial"/>
+              <a:buChar char="•"/>
+            </a:pPr>
+            <a:r>
+              <a:rPr lang="en-US" sz="2924">
+                <a:solidFill>
+                  <a:srgbClr val="383838"/>
+                </a:solidFill>
+                <a:latin typeface="DM Sans"/>
+                <a:ea typeface="DM Sans"/>
+                <a:cs typeface="DM Sans"/>
+                <a:sym typeface="DM Sans"/>
+              </a:rPr>
+              <a:t>uiControls.js</a:t>
+            </a:r>
+          </a:p>
+        </p:txBody>
+      </p:sp>
+      <p:sp>
+        <p:nvSpPr>
+          <p:cNvPr id="35" name="TextBox 35"/>
+          <p:cNvSpPr txBox="1"/>
+          <p:nvPr/>
+        </p:nvSpPr>
+        <p:spPr>
+          <a:xfrm>
+            <a:off x="1118444" y="8536930"/>
+            <a:ext cx="3604618" cy="455414"/>
+          </a:xfrm>
+          <a:prstGeom prst="rect">
+            <a:avLst/>
+          </a:prstGeom>
+        </p:spPr>
+        <p:txBody>
+          <a:bodyPr lIns="0" tIns="0" rIns="0" bIns="0" rtlCol="0" anchor="t">
+            <a:spAutoFit/>
+          </a:bodyPr>
+          <a:lstStyle/>
+          <a:p>
+            <a:pPr algn="l">
+              <a:lnSpc>
+                <a:spcPts val="3374"/>
+              </a:lnSpc>
+            </a:pPr>
+            <a:r>
+              <a:rPr lang="en-US" sz="2687">
+                <a:solidFill>
+                  <a:srgbClr val="FFFFFF"/>
+                </a:solidFill>
+                <a:latin typeface="PT Serif"/>
+                <a:ea typeface="PT Serif"/>
+                <a:cs typeface="PT Serif"/>
+                <a:sym typeface="PT Serif"/>
+              </a:rPr>
+              <a:t>Separation of Concerns</a:t>
+            </a:r>
+          </a:p>
+        </p:txBody>
+      </p:sp>
+      <p:sp>
+        <p:nvSpPr>
+          <p:cNvPr id="36" name="TextBox 36"/>
+          <p:cNvSpPr txBox="1"/>
+          <p:nvPr/>
+        </p:nvSpPr>
+        <p:spPr>
+          <a:xfrm>
+            <a:off x="6682382" y="8536930"/>
+            <a:ext cx="3491805" cy="455414"/>
+          </a:xfrm>
+          <a:prstGeom prst="rect">
+            <a:avLst/>
+          </a:prstGeom>
+        </p:spPr>
+        <p:txBody>
+          <a:bodyPr lIns="0" tIns="0" rIns="0" bIns="0" rtlCol="0" anchor="t">
+            <a:spAutoFit/>
+          </a:bodyPr>
+          <a:lstStyle/>
+          <a:p>
+            <a:pPr algn="l">
+              <a:lnSpc>
+                <a:spcPts val="3374"/>
+              </a:lnSpc>
+            </a:pPr>
+            <a:r>
+              <a:rPr lang="en-US" sz="2687">
+                <a:solidFill>
+                  <a:srgbClr val="FFFFFF"/>
+                </a:solidFill>
+                <a:latin typeface="PT Serif"/>
+                <a:ea typeface="PT Serif"/>
+                <a:cs typeface="PT Serif"/>
+                <a:sym typeface="PT Serif"/>
+              </a:rPr>
+              <a:t>Maintainable Code</a:t>
+            </a:r>
+          </a:p>
+        </p:txBody>
+      </p:sp>
+      <p:sp>
+        <p:nvSpPr>
+          <p:cNvPr id="37" name="TextBox 37"/>
+          <p:cNvSpPr txBox="1"/>
+          <p:nvPr/>
+        </p:nvSpPr>
+        <p:spPr>
+          <a:xfrm>
+            <a:off x="12246322" y="8536930"/>
+            <a:ext cx="3491805" cy="455414"/>
+          </a:xfrm>
+          <a:prstGeom prst="rect">
+            <a:avLst/>
+          </a:prstGeom>
+        </p:spPr>
+        <p:txBody>
+          <a:bodyPr lIns="0" tIns="0" rIns="0" bIns="0" rtlCol="0" anchor="t">
+            <a:spAutoFit/>
+          </a:bodyPr>
+          <a:lstStyle/>
+          <a:p>
+            <a:pPr algn="l">
+              <a:lnSpc>
+                <a:spcPts val="3374"/>
+              </a:lnSpc>
+            </a:pPr>
+            <a:r>
+              <a:rPr lang="en-US" sz="2687">
+                <a:solidFill>
+                  <a:srgbClr val="FFFFFF"/>
+                </a:solidFill>
+                <a:latin typeface="PT Serif"/>
+                <a:ea typeface="PT Serif"/>
+                <a:cs typeface="PT Serif"/>
+                <a:sym typeface="PT Serif"/>
+              </a:rPr>
+              <a:t>Scalable Design</a:t>
+            </a:r>
+          </a:p>
+        </p:txBody>
+      </p:sp>
+      <p:sp>
+        <p:nvSpPr>
+          <p:cNvPr id="38" name="TextBox 37"/>
+          <p:cNvSpPr txBox="1"/>
+          <p:nvPr/>
+        </p:nvSpPr>
+        <p:spPr>
+          <a:xfrm>
+            <a:off x="14935200" y="9789056"/>
+            <a:ext cx="9208084" cy="369332"/>
+          </a:xfrm>
+          <a:prstGeom prst="rect">
+            <a:avLst/>
+          </a:prstGeom>
+        </p:spPr>
+        <p:txBody>
+          <a:bodyPr lIns="0" tIns="0" rIns="0" bIns="0" rtlCol="0" anchor="t">
+            <a:spAutoFit/>
+          </a:bodyPr>
+          <a:lstStyle/>
+          <a:p>
+            <a:r>
+              <a:rPr lang="en-US" sz="2400" dirty="0" smtClean="0"/>
+              <a:t>Group No. 7 		3</a:t>
+            </a:r>
+            <a:endParaRPr lang="en-US" sz="2120" dirty="0">
+              <a:solidFill>
+                <a:srgbClr val="383838"/>
+              </a:solidFill>
+              <a:latin typeface="DM Sans"/>
+              <a:ea typeface="DM Sans"/>
+              <a:cs typeface="DM Sans"/>
+              <a:sym typeface="DM Sans"/>
+            </a:endParaRPr>
+          </a:p>
+        </p:txBody>
+      </p:sp>
+    </p:spTree>
+    <p:extLst>
+      <p:ext uri="{BB962C8B-B14F-4D97-AF65-F5344CB8AC3E}">
+        <p14:creationId xmlns:p14="http://schemas.microsoft.com/office/powerpoint/2010/main" val="685324681"/>
+      </p:ext>
+    </p:extLst>
+  </p:cSld>
+  <p:clrMapOvr>
+    <a:masterClrMapping/>
+  </p:clrMapOvr>
+  <p:timing>
+    <p:tnLst>
+      <p:par>
+        <p:cTn id="1" dur="indefinite" restart="never" nodeType="tmRoot"/>
+      </p:par>
+    </p:tnLst>
+  </p:timing>
+</p:sld>
+</file>
+
+<file path=ppt/slides/slide4.xml><?xml version="1.0" encoding="utf-8"?>
+<p:sld xmlns:a="http://schemas.openxmlformats.org/drawingml/2006/main" xmlns:r="http://schemas.openxmlformats.org/officeDocument/2006/relationships" xmlns:p="http://schemas.openxmlformats.org/presentationml/2006/main">
+  <p:cSld>
+    <p:spTree>
+      <p:nvGrpSpPr>
+        <p:cNvPr id="1" name=""/>
+        <p:cNvGrpSpPr/>
+        <p:nvPr/>
+      </p:nvGrpSpPr>
+      <p:grpSpPr>
+        <a:xfrm>
+          <a:off x="0" y="0"/>
+          <a:ext cx="0" cy="0"/>
+          <a:chOff x="0" y="0"/>
+          <a:chExt cx="0" cy="0"/>
+        </a:xfrm>
+      </p:grpSpPr>
+      <p:grpSp>
+        <p:nvGrpSpPr>
+          <p:cNvPr id="2" name="Group 2"/>
+          <p:cNvGrpSpPr/>
+          <p:nvPr/>
+        </p:nvGrpSpPr>
+        <p:grpSpPr>
+          <a:xfrm>
+            <a:off x="0" y="0"/>
+            <a:ext cx="18288000" cy="10287000"/>
+            <a:chOff x="0" y="0"/>
+            <a:chExt cx="24384000" cy="13716000"/>
+          </a:xfrm>
+        </p:grpSpPr>
+        <p:sp>
+          <p:nvSpPr>
+            <p:cNvPr id="3" name="Freeform 3"/>
+            <p:cNvSpPr/>
+            <p:nvPr/>
+          </p:nvSpPr>
+          <p:spPr>
+            <a:xfrm>
+              <a:off x="0" y="0"/>
+              <a:ext cx="24384000" cy="13716000"/>
+            </a:xfrm>
+            <a:custGeom>
+              <a:avLst/>
+              <a:gdLst/>
+              <a:ahLst/>
+              <a:cxnLst/>
+              <a:rect l="l" t="t" r="r" b="b"/>
+              <a:pathLst>
+                <a:path w="24384000" h="13716000">
+                  <a:moveTo>
+                    <a:pt x="0" y="0"/>
+                  </a:moveTo>
+                  <a:lnTo>
+                    <a:pt x="24384000" y="0"/>
+                  </a:lnTo>
+                  <a:lnTo>
+                    <a:pt x="24384000" y="13716000"/>
+                  </a:lnTo>
+                  <a:lnTo>
+                    <a:pt x="0" y="13716000"/>
+                  </a:lnTo>
+                  <a:close/>
+                </a:path>
+              </a:pathLst>
+            </a:custGeom>
+            <a:solidFill>
+              <a:srgbClr val="FAFAFA"/>
+            </a:solidFill>
+          </p:spPr>
+        </p:sp>
+      </p:grpSp>
+      <p:sp>
+        <p:nvSpPr>
+          <p:cNvPr id="4" name="Freeform 4"/>
+          <p:cNvSpPr/>
+          <p:nvPr/>
+        </p:nvSpPr>
+        <p:spPr>
+          <a:xfrm rot="3998324">
+            <a:off x="8132677" y="6983959"/>
+            <a:ext cx="3270792" cy="4318716"/>
+          </a:xfrm>
+          <a:custGeom>
+            <a:avLst/>
+            <a:gdLst/>
+            <a:ahLst/>
+            <a:cxnLst/>
+            <a:rect l="l" t="t" r="r" b="b"/>
+            <a:pathLst>
+              <a:path w="3270792" h="4318716">
+                <a:moveTo>
+                  <a:pt x="0" y="0"/>
+                </a:moveTo>
+                <a:lnTo>
+                  <a:pt x="3270792" y="0"/>
+                </a:lnTo>
+                <a:lnTo>
+                  <a:pt x="3270792" y="4318716"/>
+                </a:lnTo>
+                <a:lnTo>
+                  <a:pt x="0" y="4318716"/>
+                </a:lnTo>
+                <a:lnTo>
+                  <a:pt x="0" y="0"/>
+                </a:lnTo>
+                <a:close/>
+              </a:path>
+            </a:pathLst>
+          </a:custGeom>
+          <a:blipFill>
+            <a:blip r:embed="rId2">
               <a:extLst>
                 <a:ext uri="{96DAC541-7B7A-43D3-8B79-37D633B846F1}">
                   <asvg:svgBlip xmlns="" xmlns:asvg="http://schemas.microsoft.com/office/drawing/2016/SVG/main" r:embed="rId4"/>
@@ -6623,6 +8213,1037 @@
               <a:extLst>
                 <a:ext uri="{96DAC541-7B7A-43D3-8B79-37D633B846F1}">
                   <asvg:svgBlip xmlns="" xmlns:asvg="http://schemas.microsoft.com/office/drawing/2016/SVG/main" r:embed="rId6"/>
+                </a:ext>
+              </a:extLst>
+            </a:blip>
+            <a:stretch>
+              <a:fillRect/>
+            </a:stretch>
+          </a:blipFill>
+        </p:spPr>
+      </p:sp>
+      <p:grpSp>
+        <p:nvGrpSpPr>
+          <p:cNvPr id="6" name="Group 6"/>
+          <p:cNvGrpSpPr>
+            <a:grpSpLocks noChangeAspect="1"/>
+          </p:cNvGrpSpPr>
+          <p:nvPr/>
+        </p:nvGrpSpPr>
+        <p:grpSpPr>
+          <a:xfrm>
+            <a:off x="0" y="-1254807"/>
+            <a:ext cx="7450187" cy="11175281"/>
+            <a:chOff x="0" y="0"/>
+            <a:chExt cx="9144000" cy="13716000"/>
+          </a:xfrm>
+        </p:grpSpPr>
+        <p:sp>
+          <p:nvSpPr>
+            <p:cNvPr id="7" name="Freeform 7"/>
+            <p:cNvSpPr/>
+            <p:nvPr/>
+          </p:nvSpPr>
+          <p:spPr>
+            <a:xfrm>
+              <a:off x="0" y="0"/>
+              <a:ext cx="9144000" cy="13716000"/>
+            </a:xfrm>
+            <a:custGeom>
+              <a:avLst/>
+              <a:gdLst/>
+              <a:ahLst/>
+              <a:cxnLst/>
+              <a:rect l="l" t="t" r="r" b="b"/>
+              <a:pathLst>
+                <a:path w="9144000" h="13716000">
+                  <a:moveTo>
+                    <a:pt x="0" y="0"/>
+                  </a:moveTo>
+                  <a:lnTo>
+                    <a:pt x="9144000" y="0"/>
+                  </a:lnTo>
+                  <a:lnTo>
+                    <a:pt x="9144000" y="13716000"/>
+                  </a:lnTo>
+                  <a:lnTo>
+                    <a:pt x="0" y="13716000"/>
+                  </a:lnTo>
+                  <a:lnTo>
+                    <a:pt x="0" y="0"/>
+                  </a:lnTo>
+                  <a:close/>
+                </a:path>
+              </a:pathLst>
+            </a:custGeom>
+            <a:blipFill>
+              <a:blip r:embed="rId7"/>
+              <a:stretch>
+                <a:fillRect/>
+              </a:stretch>
+            </a:blipFill>
+          </p:spPr>
+        </p:sp>
+      </p:grpSp>
+      <p:grpSp>
+        <p:nvGrpSpPr>
+          <p:cNvPr id="8" name="Group 8"/>
+          <p:cNvGrpSpPr/>
+          <p:nvPr/>
+        </p:nvGrpSpPr>
+        <p:grpSpPr>
+          <a:xfrm>
+            <a:off x="7850237" y="2799309"/>
+            <a:ext cx="4580930" cy="38100"/>
+            <a:chOff x="0" y="0"/>
+            <a:chExt cx="6107907" cy="50800"/>
+          </a:xfrm>
+        </p:grpSpPr>
+        <p:sp>
+          <p:nvSpPr>
+            <p:cNvPr id="9" name="Freeform 9"/>
+            <p:cNvSpPr/>
+            <p:nvPr/>
+          </p:nvSpPr>
+          <p:spPr>
+            <a:xfrm>
+              <a:off x="0" y="0"/>
+              <a:ext cx="6107938" cy="50800"/>
+            </a:xfrm>
+            <a:custGeom>
+              <a:avLst/>
+              <a:gdLst/>
+              <a:ahLst/>
+              <a:cxnLst/>
+              <a:rect l="l" t="t" r="r" b="b"/>
+              <a:pathLst>
+                <a:path w="6107938" h="50800">
+                  <a:moveTo>
+                    <a:pt x="0" y="0"/>
+                  </a:moveTo>
+                  <a:lnTo>
+                    <a:pt x="6107938" y="0"/>
+                  </a:lnTo>
+                  <a:lnTo>
+                    <a:pt x="6107938" y="50800"/>
+                  </a:lnTo>
+                  <a:lnTo>
+                    <a:pt x="0" y="50800"/>
+                  </a:lnTo>
+                  <a:close/>
+                </a:path>
+              </a:pathLst>
+            </a:custGeom>
+            <a:solidFill>
+              <a:srgbClr val="415E87"/>
+            </a:solidFill>
+          </p:spPr>
+        </p:sp>
+      </p:grpSp>
+      <p:grpSp>
+        <p:nvGrpSpPr>
+          <p:cNvPr id="10" name="Group 10"/>
+          <p:cNvGrpSpPr/>
+          <p:nvPr/>
+        </p:nvGrpSpPr>
+        <p:grpSpPr>
+          <a:xfrm>
+            <a:off x="12714685" y="2799309"/>
+            <a:ext cx="4581079" cy="38100"/>
+            <a:chOff x="0" y="0"/>
+            <a:chExt cx="6108105" cy="50800"/>
+          </a:xfrm>
+        </p:grpSpPr>
+        <p:sp>
+          <p:nvSpPr>
+            <p:cNvPr id="11" name="Freeform 11"/>
+            <p:cNvSpPr/>
+            <p:nvPr/>
+          </p:nvSpPr>
+          <p:spPr>
+            <a:xfrm>
+              <a:off x="0" y="0"/>
+              <a:ext cx="6108065" cy="50800"/>
+            </a:xfrm>
+            <a:custGeom>
+              <a:avLst/>
+              <a:gdLst/>
+              <a:ahLst/>
+              <a:cxnLst/>
+              <a:rect l="l" t="t" r="r" b="b"/>
+              <a:pathLst>
+                <a:path w="6108065" h="50800">
+                  <a:moveTo>
+                    <a:pt x="0" y="0"/>
+                  </a:moveTo>
+                  <a:lnTo>
+                    <a:pt x="6108065" y="0"/>
+                  </a:lnTo>
+                  <a:lnTo>
+                    <a:pt x="6108065" y="50800"/>
+                  </a:lnTo>
+                  <a:lnTo>
+                    <a:pt x="0" y="50800"/>
+                  </a:lnTo>
+                  <a:close/>
+                </a:path>
+              </a:pathLst>
+            </a:custGeom>
+            <a:solidFill>
+              <a:srgbClr val="415E87"/>
+            </a:solidFill>
+          </p:spPr>
+        </p:sp>
+      </p:grpSp>
+      <p:grpSp>
+        <p:nvGrpSpPr>
+          <p:cNvPr id="12" name="Group 12"/>
+          <p:cNvGrpSpPr/>
+          <p:nvPr/>
+        </p:nvGrpSpPr>
+        <p:grpSpPr>
+          <a:xfrm>
+            <a:off x="7991922" y="7044333"/>
+            <a:ext cx="9445526" cy="38100"/>
+            <a:chOff x="0" y="0"/>
+            <a:chExt cx="12594035" cy="50800"/>
+          </a:xfrm>
+        </p:grpSpPr>
+        <p:sp>
+          <p:nvSpPr>
+            <p:cNvPr id="13" name="Freeform 13"/>
+            <p:cNvSpPr/>
+            <p:nvPr/>
+          </p:nvSpPr>
+          <p:spPr>
+            <a:xfrm>
+              <a:off x="0" y="0"/>
+              <a:ext cx="12594082" cy="50800"/>
+            </a:xfrm>
+            <a:custGeom>
+              <a:avLst/>
+              <a:gdLst/>
+              <a:ahLst/>
+              <a:cxnLst/>
+              <a:rect l="l" t="t" r="r" b="b"/>
+              <a:pathLst>
+                <a:path w="12594082" h="50800">
+                  <a:moveTo>
+                    <a:pt x="0" y="0"/>
+                  </a:moveTo>
+                  <a:lnTo>
+                    <a:pt x="12594082" y="0"/>
+                  </a:lnTo>
+                  <a:lnTo>
+                    <a:pt x="12594082" y="50800"/>
+                  </a:lnTo>
+                  <a:lnTo>
+                    <a:pt x="0" y="50800"/>
+                  </a:lnTo>
+                  <a:close/>
+                </a:path>
+              </a:pathLst>
+            </a:custGeom>
+            <a:solidFill>
+              <a:srgbClr val="415E87"/>
+            </a:solidFill>
+          </p:spPr>
+        </p:sp>
+      </p:grpSp>
+      <p:sp>
+        <p:nvSpPr>
+          <p:cNvPr id="14" name="Freeform 14"/>
+          <p:cNvSpPr/>
+          <p:nvPr/>
+        </p:nvSpPr>
+        <p:spPr>
+          <a:xfrm rot="4229768">
+            <a:off x="110895" y="4288800"/>
+            <a:ext cx="1075497" cy="995324"/>
+          </a:xfrm>
+          <a:custGeom>
+            <a:avLst/>
+            <a:gdLst/>
+            <a:ahLst/>
+            <a:cxnLst/>
+            <a:rect l="l" t="t" r="r" b="b"/>
+            <a:pathLst>
+              <a:path w="1075497" h="995324">
+                <a:moveTo>
+                  <a:pt x="0" y="0"/>
+                </a:moveTo>
+                <a:lnTo>
+                  <a:pt x="1075498" y="0"/>
+                </a:lnTo>
+                <a:lnTo>
+                  <a:pt x="1075498" y="995324"/>
+                </a:lnTo>
+                <a:lnTo>
+                  <a:pt x="0" y="995324"/>
+                </a:lnTo>
+                <a:lnTo>
+                  <a:pt x="0" y="0"/>
+                </a:lnTo>
+                <a:close/>
+              </a:path>
+            </a:pathLst>
+          </a:custGeom>
+          <a:blipFill>
+            <a:blip r:embed="rId8">
+              <a:extLst>
+                <a:ext uri="{96DAC541-7B7A-43D3-8B79-37D633B846F1}">
+                  <asvg:svgBlip xmlns="" xmlns:asvg="http://schemas.microsoft.com/office/drawing/2016/SVG/main" r:embed="rId9"/>
+                </a:ext>
+              </a:extLst>
+            </a:blip>
+            <a:stretch>
+              <a:fillRect/>
+            </a:stretch>
+          </a:blipFill>
+        </p:spPr>
+      </p:sp>
+      <p:sp>
+        <p:nvSpPr>
+          <p:cNvPr id="15" name="Freeform 15"/>
+          <p:cNvSpPr/>
+          <p:nvPr/>
+        </p:nvSpPr>
+        <p:spPr>
+          <a:xfrm rot="3471976" flipH="1" flipV="1">
+            <a:off x="11646919" y="-2755363"/>
+            <a:ext cx="5780943" cy="7633090"/>
+          </a:xfrm>
+          <a:custGeom>
+            <a:avLst/>
+            <a:gdLst/>
+            <a:ahLst/>
+            <a:cxnLst/>
+            <a:rect l="l" t="t" r="r" b="b"/>
+            <a:pathLst>
+              <a:path w="5780943" h="7633090">
+                <a:moveTo>
+                  <a:pt x="5780944" y="7633090"/>
+                </a:moveTo>
+                <a:lnTo>
+                  <a:pt x="0" y="7633090"/>
+                </a:lnTo>
+                <a:lnTo>
+                  <a:pt x="0" y="0"/>
+                </a:lnTo>
+                <a:lnTo>
+                  <a:pt x="5780944" y="0"/>
+                </a:lnTo>
+                <a:lnTo>
+                  <a:pt x="5780944" y="7633090"/>
+                </a:lnTo>
+                <a:close/>
+              </a:path>
+            </a:pathLst>
+          </a:custGeom>
+          <a:blipFill>
+            <a:blip r:embed="rId5">
+              <a:extLst>
+                <a:ext uri="{96DAC541-7B7A-43D3-8B79-37D633B846F1}">
+                  <asvg:svgBlip xmlns="" xmlns:asvg="http://schemas.microsoft.com/office/drawing/2016/SVG/main" r:embed="rId6"/>
+                </a:ext>
+              </a:extLst>
+            </a:blip>
+            <a:stretch>
+              <a:fillRect/>
+            </a:stretch>
+          </a:blipFill>
+        </p:spPr>
+      </p:sp>
+      <p:sp>
+        <p:nvSpPr>
+          <p:cNvPr id="16" name="TextBox 16"/>
+          <p:cNvSpPr txBox="1"/>
+          <p:nvPr/>
+        </p:nvSpPr>
+        <p:spPr>
+          <a:xfrm>
+            <a:off x="7850237" y="961876"/>
+            <a:ext cx="7724835" cy="919162"/>
+          </a:xfrm>
+          <a:prstGeom prst="rect">
+            <a:avLst/>
+          </a:prstGeom>
+        </p:spPr>
+        <p:txBody>
+          <a:bodyPr lIns="0" tIns="0" rIns="0" bIns="0" rtlCol="0" anchor="t">
+            <a:spAutoFit/>
+          </a:bodyPr>
+          <a:lstStyle/>
+          <a:p>
+            <a:pPr algn="l">
+              <a:lnSpc>
+                <a:spcPts val="7312"/>
+              </a:lnSpc>
+            </a:pPr>
+            <a:r>
+              <a:rPr lang="en-US" sz="5812" b="1">
+                <a:solidFill>
+                  <a:srgbClr val="020202"/>
+                </a:solidFill>
+                <a:latin typeface="PT Serif Bold"/>
+                <a:ea typeface="PT Serif Bold"/>
+                <a:cs typeface="PT Serif Bold"/>
+                <a:sym typeface="PT Serif Bold"/>
+              </a:rPr>
+              <a:t>User Interaction Flow</a:t>
+            </a:r>
+          </a:p>
+        </p:txBody>
+      </p:sp>
+      <p:sp>
+        <p:nvSpPr>
+          <p:cNvPr id="17" name="TextBox 17"/>
+          <p:cNvSpPr txBox="1"/>
+          <p:nvPr/>
+        </p:nvSpPr>
+        <p:spPr>
+          <a:xfrm>
+            <a:off x="7991922" y="2269777"/>
+            <a:ext cx="553862" cy="414337"/>
+          </a:xfrm>
+          <a:prstGeom prst="rect">
+            <a:avLst/>
+          </a:prstGeom>
+        </p:spPr>
+        <p:txBody>
+          <a:bodyPr lIns="0" tIns="0" rIns="0" bIns="0" rtlCol="0" anchor="t">
+            <a:spAutoFit/>
+          </a:bodyPr>
+          <a:lstStyle/>
+          <a:p>
+            <a:pPr algn="l">
+              <a:lnSpc>
+                <a:spcPts val="3562"/>
+              </a:lnSpc>
+            </a:pPr>
+            <a:r>
+              <a:rPr lang="en-US" sz="2187">
+                <a:solidFill>
+                  <a:srgbClr val="383838"/>
+                </a:solidFill>
+                <a:latin typeface="PT Serif"/>
+                <a:ea typeface="PT Serif"/>
+                <a:cs typeface="PT Serif"/>
+                <a:sym typeface="PT Serif"/>
+              </a:rPr>
+              <a:t>01</a:t>
+            </a:r>
+          </a:p>
+        </p:txBody>
+      </p:sp>
+      <p:sp>
+        <p:nvSpPr>
+          <p:cNvPr id="18" name="TextBox 18"/>
+          <p:cNvSpPr txBox="1"/>
+          <p:nvPr/>
+        </p:nvSpPr>
+        <p:spPr>
+          <a:xfrm>
+            <a:off x="7991922" y="2998142"/>
+            <a:ext cx="3721299" cy="484137"/>
+          </a:xfrm>
+          <a:prstGeom prst="rect">
+            <a:avLst/>
+          </a:prstGeom>
+        </p:spPr>
+        <p:txBody>
+          <a:bodyPr lIns="0" tIns="0" rIns="0" bIns="0" rtlCol="0" anchor="t">
+            <a:spAutoFit/>
+          </a:bodyPr>
+          <a:lstStyle/>
+          <a:p>
+            <a:pPr algn="l">
+              <a:lnSpc>
+                <a:spcPts val="3625"/>
+              </a:lnSpc>
+            </a:pPr>
+            <a:r>
+              <a:rPr lang="en-US" sz="2874">
+                <a:solidFill>
+                  <a:srgbClr val="383838"/>
+                </a:solidFill>
+                <a:latin typeface="PT Serif"/>
+                <a:ea typeface="PT Serif"/>
+                <a:cs typeface="PT Serif"/>
+                <a:sym typeface="PT Serif"/>
+              </a:rPr>
+              <a:t>Create Graph</a:t>
+            </a:r>
+          </a:p>
+        </p:txBody>
+      </p:sp>
+      <p:sp>
+        <p:nvSpPr>
+          <p:cNvPr id="19" name="TextBox 19"/>
+          <p:cNvSpPr txBox="1"/>
+          <p:nvPr/>
+        </p:nvSpPr>
+        <p:spPr>
+          <a:xfrm>
+            <a:off x="7991922" y="3557141"/>
+            <a:ext cx="4580930" cy="2363391"/>
+          </a:xfrm>
+          <a:prstGeom prst="rect">
+            <a:avLst/>
+          </a:prstGeom>
+        </p:spPr>
+        <p:txBody>
+          <a:bodyPr lIns="0" tIns="0" rIns="0" bIns="0" rtlCol="0" anchor="t">
+            <a:spAutoFit/>
+          </a:bodyPr>
+          <a:lstStyle/>
+          <a:p>
+            <a:pPr algn="l">
+              <a:lnSpc>
+                <a:spcPts val="3562"/>
+              </a:lnSpc>
+            </a:pPr>
+            <a:r>
+              <a:rPr lang="en-US" sz="2187">
+                <a:solidFill>
+                  <a:srgbClr val="383838"/>
+                </a:solidFill>
+                <a:latin typeface="DM Sans"/>
+                <a:ea typeface="DM Sans"/>
+                <a:cs typeface="DM Sans"/>
+                <a:sym typeface="DM Sans"/>
+              </a:rPr>
+              <a:t>Choose between random generation (select node count and density) or interactive mode (drag nodes to connect and set edge weights).</a:t>
+            </a:r>
+          </a:p>
+        </p:txBody>
+      </p:sp>
+      <p:sp>
+        <p:nvSpPr>
+          <p:cNvPr id="20" name="TextBox 20"/>
+          <p:cNvSpPr txBox="1"/>
+          <p:nvPr/>
+        </p:nvSpPr>
+        <p:spPr>
+          <a:xfrm>
+            <a:off x="12714685" y="2269777"/>
+            <a:ext cx="418690" cy="414337"/>
+          </a:xfrm>
+          <a:prstGeom prst="rect">
+            <a:avLst/>
+          </a:prstGeom>
+        </p:spPr>
+        <p:txBody>
+          <a:bodyPr lIns="0" tIns="0" rIns="0" bIns="0" rtlCol="0" anchor="t">
+            <a:spAutoFit/>
+          </a:bodyPr>
+          <a:lstStyle/>
+          <a:p>
+            <a:pPr algn="l">
+              <a:lnSpc>
+                <a:spcPts val="3562"/>
+              </a:lnSpc>
+            </a:pPr>
+            <a:r>
+              <a:rPr lang="en-US" sz="2187">
+                <a:solidFill>
+                  <a:srgbClr val="383838"/>
+                </a:solidFill>
+                <a:latin typeface="PT Serif"/>
+                <a:ea typeface="PT Serif"/>
+                <a:cs typeface="PT Serif"/>
+                <a:sym typeface="PT Serif"/>
+              </a:rPr>
+              <a:t>02</a:t>
+            </a:r>
+          </a:p>
+        </p:txBody>
+      </p:sp>
+      <p:sp>
+        <p:nvSpPr>
+          <p:cNvPr id="21" name="TextBox 21"/>
+          <p:cNvSpPr txBox="1"/>
+          <p:nvPr/>
+        </p:nvSpPr>
+        <p:spPr>
+          <a:xfrm>
+            <a:off x="12714685" y="2998142"/>
+            <a:ext cx="3721299" cy="484137"/>
+          </a:xfrm>
+          <a:prstGeom prst="rect">
+            <a:avLst/>
+          </a:prstGeom>
+        </p:spPr>
+        <p:txBody>
+          <a:bodyPr lIns="0" tIns="0" rIns="0" bIns="0" rtlCol="0" anchor="t">
+            <a:spAutoFit/>
+          </a:bodyPr>
+          <a:lstStyle/>
+          <a:p>
+            <a:pPr algn="l">
+              <a:lnSpc>
+                <a:spcPts val="3625"/>
+              </a:lnSpc>
+            </a:pPr>
+            <a:r>
+              <a:rPr lang="en-US" sz="2874">
+                <a:solidFill>
+                  <a:srgbClr val="383838"/>
+                </a:solidFill>
+                <a:latin typeface="PT Serif"/>
+                <a:ea typeface="PT Serif"/>
+                <a:cs typeface="PT Serif"/>
+                <a:sym typeface="PT Serif"/>
+              </a:rPr>
+              <a:t>Select Algorithm</a:t>
+            </a:r>
+          </a:p>
+        </p:txBody>
+      </p:sp>
+      <p:sp>
+        <p:nvSpPr>
+          <p:cNvPr id="22" name="TextBox 22"/>
+          <p:cNvSpPr txBox="1"/>
+          <p:nvPr/>
+        </p:nvSpPr>
+        <p:spPr>
+          <a:xfrm>
+            <a:off x="12714685" y="3557141"/>
+            <a:ext cx="4581079" cy="1456135"/>
+          </a:xfrm>
+          <a:prstGeom prst="rect">
+            <a:avLst/>
+          </a:prstGeom>
+        </p:spPr>
+        <p:txBody>
+          <a:bodyPr lIns="0" tIns="0" rIns="0" bIns="0" rtlCol="0" anchor="t">
+            <a:spAutoFit/>
+          </a:bodyPr>
+          <a:lstStyle/>
+          <a:p>
+            <a:pPr algn="l">
+              <a:lnSpc>
+                <a:spcPts val="3562"/>
+              </a:lnSpc>
+            </a:pPr>
+            <a:r>
+              <a:rPr lang="en-US" sz="2187">
+                <a:solidFill>
+                  <a:srgbClr val="383838"/>
+                </a:solidFill>
+                <a:latin typeface="DM Sans"/>
+                <a:ea typeface="DM Sans"/>
+                <a:cs typeface="DM Sans"/>
+                <a:sym typeface="DM Sans"/>
+              </a:rPr>
+              <a:t>Pick Kruskal's or Prim's algorithm. For Prim's, specify your source vertex to begin tree construction.</a:t>
+            </a:r>
+          </a:p>
+        </p:txBody>
+      </p:sp>
+      <p:sp>
+        <p:nvSpPr>
+          <p:cNvPr id="23" name="TextBox 23"/>
+          <p:cNvSpPr txBox="1"/>
+          <p:nvPr/>
+        </p:nvSpPr>
+        <p:spPr>
+          <a:xfrm>
+            <a:off x="7991922" y="6514803"/>
+            <a:ext cx="553862" cy="414337"/>
+          </a:xfrm>
+          <a:prstGeom prst="rect">
+            <a:avLst/>
+          </a:prstGeom>
+        </p:spPr>
+        <p:txBody>
+          <a:bodyPr lIns="0" tIns="0" rIns="0" bIns="0" rtlCol="0" anchor="t">
+            <a:spAutoFit/>
+          </a:bodyPr>
+          <a:lstStyle/>
+          <a:p>
+            <a:pPr algn="l">
+              <a:lnSpc>
+                <a:spcPts val="3562"/>
+              </a:lnSpc>
+            </a:pPr>
+            <a:r>
+              <a:rPr lang="en-US" sz="2187">
+                <a:solidFill>
+                  <a:srgbClr val="383838"/>
+                </a:solidFill>
+                <a:latin typeface="PT Serif"/>
+                <a:ea typeface="PT Serif"/>
+                <a:cs typeface="PT Serif"/>
+                <a:sym typeface="PT Serif"/>
+              </a:rPr>
+              <a:t>03</a:t>
+            </a:r>
+          </a:p>
+        </p:txBody>
+      </p:sp>
+      <p:sp>
+        <p:nvSpPr>
+          <p:cNvPr id="24" name="TextBox 24"/>
+          <p:cNvSpPr txBox="1"/>
+          <p:nvPr/>
+        </p:nvSpPr>
+        <p:spPr>
+          <a:xfrm>
+            <a:off x="7991922" y="7243168"/>
+            <a:ext cx="3721299" cy="484138"/>
+          </a:xfrm>
+          <a:prstGeom prst="rect">
+            <a:avLst/>
+          </a:prstGeom>
+        </p:spPr>
+        <p:txBody>
+          <a:bodyPr lIns="0" tIns="0" rIns="0" bIns="0" rtlCol="0" anchor="t">
+            <a:spAutoFit/>
+          </a:bodyPr>
+          <a:lstStyle/>
+          <a:p>
+            <a:pPr algn="l">
+              <a:lnSpc>
+                <a:spcPts val="3625"/>
+              </a:lnSpc>
+            </a:pPr>
+            <a:r>
+              <a:rPr lang="en-US" sz="2874">
+                <a:solidFill>
+                  <a:srgbClr val="383838"/>
+                </a:solidFill>
+                <a:latin typeface="PT Serif"/>
+                <a:ea typeface="PT Serif"/>
+                <a:cs typeface="PT Serif"/>
+                <a:sym typeface="PT Serif"/>
+              </a:rPr>
+              <a:t>Visualize Execution</a:t>
+            </a:r>
+          </a:p>
+        </p:txBody>
+      </p:sp>
+      <p:sp>
+        <p:nvSpPr>
+          <p:cNvPr id="25" name="TextBox 25"/>
+          <p:cNvSpPr txBox="1"/>
+          <p:nvPr/>
+        </p:nvSpPr>
+        <p:spPr>
+          <a:xfrm>
+            <a:off x="7991922" y="7802165"/>
+            <a:ext cx="9445526" cy="1456135"/>
+          </a:xfrm>
+          <a:prstGeom prst="rect">
+            <a:avLst/>
+          </a:prstGeom>
+        </p:spPr>
+        <p:txBody>
+          <a:bodyPr lIns="0" tIns="0" rIns="0" bIns="0" rtlCol="0" anchor="t">
+            <a:spAutoFit/>
+          </a:bodyPr>
+          <a:lstStyle/>
+          <a:p>
+            <a:pPr algn="l">
+              <a:lnSpc>
+                <a:spcPts val="3562"/>
+              </a:lnSpc>
+            </a:pPr>
+            <a:r>
+              <a:rPr lang="en-US" sz="2187">
+                <a:solidFill>
+                  <a:srgbClr val="383838"/>
+                </a:solidFill>
+                <a:latin typeface="DM Sans"/>
+                <a:ea typeface="DM Sans"/>
+                <a:cs typeface="DM Sans"/>
+                <a:sym typeface="DM Sans"/>
+              </a:rPr>
+              <a:t>Run the algorithm step-by-step with pause/resume control. Monitor real-time metrics, edge selections, and tree growth as the algorithm progresses.</a:t>
+            </a:r>
+          </a:p>
+        </p:txBody>
+      </p:sp>
+      <p:sp>
+        <p:nvSpPr>
+          <p:cNvPr id="26" name="Freeform 26"/>
+          <p:cNvSpPr/>
+          <p:nvPr/>
+        </p:nvSpPr>
+        <p:spPr>
+          <a:xfrm rot="6286086" flipV="1">
+            <a:off x="6636319" y="6967864"/>
+            <a:ext cx="1075497" cy="995324"/>
+          </a:xfrm>
+          <a:custGeom>
+            <a:avLst/>
+            <a:gdLst/>
+            <a:ahLst/>
+            <a:cxnLst/>
+            <a:rect l="l" t="t" r="r" b="b"/>
+            <a:pathLst>
+              <a:path w="1075497" h="995324">
+                <a:moveTo>
+                  <a:pt x="0" y="995324"/>
+                </a:moveTo>
+                <a:lnTo>
+                  <a:pt x="1075497" y="995324"/>
+                </a:lnTo>
+                <a:lnTo>
+                  <a:pt x="1075497" y="0"/>
+                </a:lnTo>
+                <a:lnTo>
+                  <a:pt x="0" y="0"/>
+                </a:lnTo>
+                <a:lnTo>
+                  <a:pt x="0" y="995324"/>
+                </a:lnTo>
+                <a:close/>
+              </a:path>
+            </a:pathLst>
+          </a:custGeom>
+          <a:blipFill>
+            <a:blip r:embed="rId8">
+              <a:extLst>
+                <a:ext uri="{96DAC541-7B7A-43D3-8B79-37D633B846F1}">
+                  <asvg:svgBlip xmlns="" xmlns:asvg="http://schemas.microsoft.com/office/drawing/2016/SVG/main" r:embed="rId9"/>
+                </a:ext>
+              </a:extLst>
+            </a:blip>
+            <a:stretch>
+              <a:fillRect/>
+            </a:stretch>
+          </a:blipFill>
+        </p:spPr>
+      </p:sp>
+      <p:sp>
+        <p:nvSpPr>
+          <p:cNvPr id="27" name="TextBox 26"/>
+          <p:cNvSpPr txBox="1"/>
+          <p:nvPr/>
+        </p:nvSpPr>
+        <p:spPr>
+          <a:xfrm>
+            <a:off x="14935200" y="9789056"/>
+            <a:ext cx="9208084" cy="369332"/>
+          </a:xfrm>
+          <a:prstGeom prst="rect">
+            <a:avLst/>
+          </a:prstGeom>
+        </p:spPr>
+        <p:txBody>
+          <a:bodyPr lIns="0" tIns="0" rIns="0" bIns="0" rtlCol="0" anchor="t">
+            <a:spAutoFit/>
+          </a:bodyPr>
+          <a:lstStyle/>
+          <a:p>
+            <a:r>
+              <a:rPr lang="en-US" sz="2400" dirty="0" smtClean="0"/>
+              <a:t>Group No. 7 		</a:t>
+            </a:r>
+            <a:r>
+              <a:rPr lang="en-US" sz="2400" dirty="0"/>
+              <a:t>4</a:t>
+            </a:r>
+            <a:endParaRPr lang="en-US" sz="2120" dirty="0">
+              <a:solidFill>
+                <a:srgbClr val="383838"/>
+              </a:solidFill>
+              <a:latin typeface="DM Sans"/>
+              <a:ea typeface="DM Sans"/>
+              <a:cs typeface="DM Sans"/>
+              <a:sym typeface="DM Sans"/>
+            </a:endParaRPr>
+          </a:p>
+        </p:txBody>
+      </p:sp>
+    </p:spTree>
+    <p:extLst>
+      <p:ext uri="{BB962C8B-B14F-4D97-AF65-F5344CB8AC3E}">
+        <p14:creationId xmlns:p14="http://schemas.microsoft.com/office/powerpoint/2010/main" val="2337971106"/>
+      </p:ext>
+    </p:extLst>
+  </p:cSld>
+  <p:clrMapOvr>
+    <a:masterClrMapping/>
+  </p:clrMapOvr>
+  <p:timing>
+    <p:tnLst>
+      <p:par>
+        <p:cTn id="1" dur="indefinite" restart="never" nodeType="tmRoot"/>
+      </p:par>
+    </p:tnLst>
+  </p:timing>
+</p:sld>
+</file>
+
+<file path=ppt/slides/slide5.xml><?xml version="1.0" encoding="utf-8"?>
+<p:sld xmlns:a="http://schemas.openxmlformats.org/drawingml/2006/main" xmlns:r="http://schemas.openxmlformats.org/officeDocument/2006/relationships" xmlns:p="http://schemas.openxmlformats.org/presentationml/2006/main">
+  <p:cSld>
+    <p:spTree>
+      <p:nvGrpSpPr>
+        <p:cNvPr id="1" name=""/>
+        <p:cNvGrpSpPr/>
+        <p:nvPr/>
+      </p:nvGrpSpPr>
+      <p:grpSpPr>
+        <a:xfrm>
+          <a:off x="0" y="0"/>
+          <a:ext cx="0" cy="0"/>
+          <a:chOff x="0" y="0"/>
+          <a:chExt cx="0" cy="0"/>
+        </a:xfrm>
+      </p:grpSpPr>
+      <p:grpSp>
+        <p:nvGrpSpPr>
+          <p:cNvPr id="2" name="Group 2"/>
+          <p:cNvGrpSpPr/>
+          <p:nvPr/>
+        </p:nvGrpSpPr>
+        <p:grpSpPr>
+          <a:xfrm>
+            <a:off x="0" y="0"/>
+            <a:ext cx="18288000" cy="10287000"/>
+            <a:chOff x="0" y="0"/>
+            <a:chExt cx="24384000" cy="13716000"/>
+          </a:xfrm>
+        </p:grpSpPr>
+        <p:sp>
+          <p:nvSpPr>
+            <p:cNvPr id="3" name="Freeform 3"/>
+            <p:cNvSpPr/>
+            <p:nvPr/>
+          </p:nvSpPr>
+          <p:spPr>
+            <a:xfrm>
+              <a:off x="0" y="0"/>
+              <a:ext cx="24384000" cy="13716000"/>
+            </a:xfrm>
+            <a:custGeom>
+              <a:avLst/>
+              <a:gdLst/>
+              <a:ahLst/>
+              <a:cxnLst/>
+              <a:rect l="l" t="t" r="r" b="b"/>
+              <a:pathLst>
+                <a:path w="24384000" h="13716000">
+                  <a:moveTo>
+                    <a:pt x="0" y="0"/>
+                  </a:moveTo>
+                  <a:lnTo>
+                    <a:pt x="24384000" y="0"/>
+                  </a:lnTo>
+                  <a:lnTo>
+                    <a:pt x="24384000" y="13716000"/>
+                  </a:lnTo>
+                  <a:lnTo>
+                    <a:pt x="0" y="13716000"/>
+                  </a:lnTo>
+                  <a:close/>
+                </a:path>
+              </a:pathLst>
+            </a:custGeom>
+            <a:solidFill>
+              <a:srgbClr val="FAFAFA"/>
+            </a:solidFill>
+          </p:spPr>
+        </p:sp>
+      </p:grpSp>
+      <p:sp>
+        <p:nvSpPr>
+          <p:cNvPr id="4" name="Freeform 4"/>
+          <p:cNvSpPr/>
+          <p:nvPr/>
+        </p:nvSpPr>
+        <p:spPr>
+          <a:xfrm rot="3998324">
+            <a:off x="8132677" y="6983959"/>
+            <a:ext cx="3270792" cy="4318716"/>
+          </a:xfrm>
+          <a:custGeom>
+            <a:avLst/>
+            <a:gdLst/>
+            <a:ahLst/>
+            <a:cxnLst/>
+            <a:rect l="l" t="t" r="r" b="b"/>
+            <a:pathLst>
+              <a:path w="3270792" h="4318716">
+                <a:moveTo>
+                  <a:pt x="0" y="0"/>
+                </a:moveTo>
+                <a:lnTo>
+                  <a:pt x="3270792" y="0"/>
+                </a:lnTo>
+                <a:lnTo>
+                  <a:pt x="3270792" y="4318716"/>
+                </a:lnTo>
+                <a:lnTo>
+                  <a:pt x="0" y="4318716"/>
+                </a:lnTo>
+                <a:lnTo>
+                  <a:pt x="0" y="0"/>
+                </a:lnTo>
+                <a:close/>
+              </a:path>
+            </a:pathLst>
+          </a:custGeom>
+          <a:blipFill>
+            <a:blip r:embed="rId3">
+              <a:extLst>
+                <a:ext uri="{96DAC541-7B7A-43D3-8B79-37D633B846F1}">
+                  <asvg:svgBlip xmlns:asvg="http://schemas.microsoft.com/office/drawing/2016/SVG/main" xmlns="" r:embed="rId4"/>
+                </a:ext>
+              </a:extLst>
+            </a:blip>
+            <a:stretch>
+              <a:fillRect/>
+            </a:stretch>
+          </a:blipFill>
+        </p:spPr>
+      </p:sp>
+      <p:sp>
+        <p:nvSpPr>
+          <p:cNvPr id="5" name="Freeform 5"/>
+          <p:cNvSpPr/>
+          <p:nvPr/>
+        </p:nvSpPr>
+        <p:spPr>
+          <a:xfrm rot="1695503">
+            <a:off x="-667352" y="-1248037"/>
+            <a:ext cx="5780943" cy="7633090"/>
+          </a:xfrm>
+          <a:custGeom>
+            <a:avLst/>
+            <a:gdLst/>
+            <a:ahLst/>
+            <a:cxnLst/>
+            <a:rect l="l" t="t" r="r" b="b"/>
+            <a:pathLst>
+              <a:path w="5780943" h="7633090">
+                <a:moveTo>
+                  <a:pt x="0" y="0"/>
+                </a:moveTo>
+                <a:lnTo>
+                  <a:pt x="5780944" y="0"/>
+                </a:lnTo>
+                <a:lnTo>
+                  <a:pt x="5780944" y="7633091"/>
+                </a:lnTo>
+                <a:lnTo>
+                  <a:pt x="0" y="7633091"/>
+                </a:lnTo>
+                <a:lnTo>
+                  <a:pt x="0" y="0"/>
+                </a:lnTo>
+                <a:close/>
+              </a:path>
+            </a:pathLst>
+          </a:custGeom>
+          <a:blipFill>
+            <a:blip r:embed="rId5">
+              <a:extLst>
+                <a:ext uri="{96DAC541-7B7A-43D3-8B79-37D633B846F1}">
+                  <asvg:svgBlip xmlns:asvg="http://schemas.microsoft.com/office/drawing/2016/SVG/main" xmlns="" r:embed="rId6"/>
                 </a:ext>
               </a:extLst>
             </a:blip>
@@ -7628,7 +10249,11 @@
           <a:p>
             <a:r>
               <a:rPr lang="en-US" sz="2400" dirty="0" smtClean="0"/>
-              <a:t>Group No. 7 		3</a:t>
+              <a:t>Group No. 7 		</a:t>
+            </a:r>
+            <a:r>
+              <a:rPr lang="en-US" sz="2400" dirty="0"/>
+              <a:t>5</a:t>
             </a:r>
             <a:endParaRPr lang="en-US" sz="2120" dirty="0">
               <a:solidFill>
@@ -7657,7 +10282,7 @@
 </p:sld>
 </file>
 
-<file path=ppt/slides/slide4.xml><?xml version="1.0" encoding="utf-8"?>
+<file path=ppt/slides/slide6.xml><?xml version="1.0" encoding="utf-8"?>
 <p:sld xmlns:a="http://schemas.openxmlformats.org/drawingml/2006/main" xmlns:r="http://schemas.openxmlformats.org/officeDocument/2006/relationships" xmlns:p="http://schemas.openxmlformats.org/presentationml/2006/main">
   <p:cSld>
     <p:spTree>
@@ -7826,7 +10451,7 @@
             <a:blip r:embed="rId3">
               <a:extLst>
                 <a:ext uri="{96DAC541-7B7A-43D3-8B79-37D633B846F1}">
-                  <asvg:svgBlip xmlns="" xmlns:asvg="http://schemas.microsoft.com/office/drawing/2016/SVG/main" r:embed="rId4"/>
+                  <asvg:svgBlip xmlns:asvg="http://schemas.microsoft.com/office/drawing/2016/SVG/main" xmlns="" r:embed="rId4"/>
                 </a:ext>
               </a:extLst>
             </a:blip>
@@ -7878,7 +10503,7 @@
             <a:blip r:embed="rId5">
               <a:extLst>
                 <a:ext uri="{96DAC541-7B7A-43D3-8B79-37D633B846F1}">
-                  <asvg:svgBlip xmlns="" xmlns:asvg="http://schemas.microsoft.com/office/drawing/2016/SVG/main" r:embed="rId6"/>
+                  <asvg:svgBlip xmlns:asvg="http://schemas.microsoft.com/office/drawing/2016/SVG/main" xmlns="" r:embed="rId6"/>
                 </a:ext>
               </a:extLst>
             </a:blip>
@@ -8143,7 +10768,7 @@
             <a:blip r:embed="rId5">
               <a:extLst>
                 <a:ext uri="{96DAC541-7B7A-43D3-8B79-37D633B846F1}">
-                  <asvg:svgBlip xmlns="" xmlns:asvg="http://schemas.microsoft.com/office/drawing/2016/SVG/main" r:embed="rId6"/>
+                  <asvg:svgBlip xmlns:asvg="http://schemas.microsoft.com/office/drawing/2016/SVG/main" xmlns="" r:embed="rId6"/>
                 </a:ext>
               </a:extLst>
             </a:blip>
@@ -8968,7 +11593,11 @@
           <a:p>
             <a:r>
               <a:rPr lang="en-US" sz="2400" dirty="0" smtClean="0"/>
-              <a:t>Group No. 7 		4</a:t>
+              <a:t>Group No. 7 		</a:t>
+            </a:r>
+            <a:r>
+              <a:rPr lang="en-US" sz="2400" dirty="0"/>
+              <a:t>6</a:t>
             </a:r>
             <a:endParaRPr lang="en-US" sz="2120" dirty="0">
               <a:solidFill>
@@ -8997,7 +11626,7 @@
 </p:sld>
 </file>
 
-<file path=ppt/slides/slide5.xml><?xml version="1.0" encoding="utf-8"?>
+<file path=ppt/slides/slide7.xml><?xml version="1.0" encoding="utf-8"?>
 <p:sld xmlns:a="http://schemas.openxmlformats.org/drawingml/2006/main" xmlns:r="http://schemas.openxmlformats.org/officeDocument/2006/relationships" xmlns:p="http://schemas.openxmlformats.org/presentationml/2006/main">
   <p:cSld>
     <p:spTree>
@@ -9056,7 +11685,7 @@
             <a:blip r:embed="rId3">
               <a:extLst>
                 <a:ext uri="{96DAC541-7B7A-43D3-8B79-37D633B846F1}">
-                  <asvg:svgBlip xmlns="" xmlns:asvg="http://schemas.microsoft.com/office/drawing/2016/SVG/main" r:embed="rId4"/>
+                  <asvg:svgBlip xmlns:asvg="http://schemas.microsoft.com/office/drawing/2016/SVG/main" xmlns="" r:embed="rId4"/>
                 </a:ext>
               </a:extLst>
             </a:blip>
@@ -9108,7 +11737,7 @@
             <a:blip r:embed="rId3">
               <a:extLst>
                 <a:ext uri="{96DAC541-7B7A-43D3-8B79-37D633B846F1}">
-                  <asvg:svgBlip xmlns="" xmlns:asvg="http://schemas.microsoft.com/office/drawing/2016/SVG/main" r:embed="rId4"/>
+                  <asvg:svgBlip xmlns:asvg="http://schemas.microsoft.com/office/drawing/2016/SVG/main" xmlns="" r:embed="rId4"/>
                 </a:ext>
               </a:extLst>
             </a:blip>
@@ -9160,7 +11789,7 @@
             <a:blip r:embed="rId5">
               <a:extLst>
                 <a:ext uri="{96DAC541-7B7A-43D3-8B79-37D633B846F1}">
-                  <asvg:svgBlip xmlns="" xmlns:asvg="http://schemas.microsoft.com/office/drawing/2016/SVG/main" r:embed="rId6"/>
+                  <asvg:svgBlip xmlns:asvg="http://schemas.microsoft.com/office/drawing/2016/SVG/main" xmlns="" r:embed="rId6"/>
                 </a:ext>
               </a:extLst>
             </a:blip>
@@ -10413,7 +13042,11 @@
           <a:p>
             <a:r>
               <a:rPr lang="en-US" sz="2400" dirty="0" smtClean="0"/>
-              <a:t>Group No. 7 		5</a:t>
+              <a:t>Group No. 7 		</a:t>
+            </a:r>
+            <a:r>
+              <a:rPr lang="en-US" sz="2400" dirty="0"/>
+              <a:t>7</a:t>
             </a:r>
             <a:endParaRPr lang="en-US" sz="2120" dirty="0">
               <a:solidFill>
@@ -10442,7 +13075,7 @@
 </p:sld>
 </file>
 
-<file path=ppt/slides/slide6.xml><?xml version="1.0" encoding="utf-8"?>
+<file path=ppt/slides/slide8.xml><?xml version="1.0" encoding="utf-8"?>
 <p:sld xmlns:a="http://schemas.openxmlformats.org/drawingml/2006/main" xmlns:r="http://schemas.openxmlformats.org/officeDocument/2006/relationships" xmlns:p="http://schemas.openxmlformats.org/presentationml/2006/main">
   <p:cSld>
     <p:spTree>
@@ -10769,7 +13402,11 @@
           <a:p>
             <a:r>
               <a:rPr lang="en-US" sz="2400" dirty="0" smtClean="0"/>
-              <a:t>Group No. 7 		6</a:t>
+              <a:t>Group No. 7 		</a:t>
+            </a:r>
+            <a:r>
+              <a:rPr lang="en-US" sz="2400" dirty="0"/>
+              <a:t>8</a:t>
             </a:r>
             <a:endParaRPr lang="en-US" sz="2120" dirty="0">
               <a:solidFill>
@@ -10798,7 +13435,7 @@
 </p:sld>
 </file>
 
-<file path=ppt/slides/slide7.xml><?xml version="1.0" encoding="utf-8"?>
+<file path=ppt/slides/slide9.xml><?xml version="1.0" encoding="utf-8"?>
 <p:sld xmlns:a="http://schemas.openxmlformats.org/drawingml/2006/main" xmlns:r="http://schemas.openxmlformats.org/officeDocument/2006/relationships" xmlns:p="http://schemas.openxmlformats.org/presentationml/2006/main">
   <p:cSld>
     <p:spTree>
@@ -10857,7 +13494,7 @@
             <a:blip r:embed="rId3">
               <a:extLst>
                 <a:ext uri="{96DAC541-7B7A-43D3-8B79-37D633B846F1}">
-                  <asvg:svgBlip xmlns="" xmlns:asvg="http://schemas.microsoft.com/office/drawing/2016/SVG/main" r:embed="rId4"/>
+                  <asvg:svgBlip xmlns:asvg="http://schemas.microsoft.com/office/drawing/2016/SVG/main" xmlns="" r:embed="rId4"/>
                 </a:ext>
               </a:extLst>
             </a:blip>
@@ -10909,7 +13546,7 @@
             <a:blip r:embed="rId5">
               <a:extLst>
                 <a:ext uri="{96DAC541-7B7A-43D3-8B79-37D633B846F1}">
-                  <asvg:svgBlip xmlns="" xmlns:asvg="http://schemas.microsoft.com/office/drawing/2016/SVG/main" r:embed="rId6"/>
+                  <asvg:svgBlip xmlns:asvg="http://schemas.microsoft.com/office/drawing/2016/SVG/main" xmlns="" r:embed="rId6"/>
                 </a:ext>
               </a:extLst>
             </a:blip>
@@ -11133,11 +13770,7 @@
             </a:r>
             <a:r>
               <a:rPr lang="en-US" sz="2400" smtClean="0"/>
-              <a:t>~</a:t>
-            </a:r>
-            <a:r>
-              <a:rPr lang="en-US" sz="2400" smtClean="0"/>
-              <a:t>500</a:t>
+              <a:t>~500</a:t>
             </a:r>
             <a:endParaRPr lang="en-US" sz="2400" dirty="0" smtClean="0"/>
           </a:p>

</xml_diff>